<commit_message>
Add installation update site page.
</commit_message>
<xml_diff>
--- a/docs/tern.java_fr.pptx
+++ b/docs/tern.java_fr.pptx
@@ -17,22 +17,25 @@
     <p:sldId id="276" r:id="rId11"/>
     <p:sldId id="274" r:id="rId12"/>
     <p:sldId id="279" r:id="rId13"/>
-    <p:sldId id="278" r:id="rId14"/>
-    <p:sldId id="271" r:id="rId15"/>
-    <p:sldId id="281" r:id="rId16"/>
-    <p:sldId id="282" r:id="rId17"/>
-    <p:sldId id="283" r:id="rId18"/>
-    <p:sldId id="273" r:id="rId19"/>
-    <p:sldId id="286" r:id="rId20"/>
-    <p:sldId id="284" r:id="rId21"/>
-    <p:sldId id="272" r:id="rId22"/>
-    <p:sldId id="269" r:id="rId23"/>
-    <p:sldId id="263" r:id="rId24"/>
-    <p:sldId id="265" r:id="rId25"/>
-    <p:sldId id="266" r:id="rId26"/>
-    <p:sldId id="267" r:id="rId27"/>
-    <p:sldId id="264" r:id="rId28"/>
-    <p:sldId id="268" r:id="rId29"/>
+    <p:sldId id="287" r:id="rId14"/>
+    <p:sldId id="278" r:id="rId15"/>
+    <p:sldId id="271" r:id="rId16"/>
+    <p:sldId id="281" r:id="rId17"/>
+    <p:sldId id="282" r:id="rId18"/>
+    <p:sldId id="283" r:id="rId19"/>
+    <p:sldId id="273" r:id="rId20"/>
+    <p:sldId id="285" r:id="rId21"/>
+    <p:sldId id="286" r:id="rId22"/>
+    <p:sldId id="284" r:id="rId23"/>
+    <p:sldId id="272" r:id="rId24"/>
+    <p:sldId id="269" r:id="rId25"/>
+    <p:sldId id="263" r:id="rId26"/>
+    <p:sldId id="265" r:id="rId27"/>
+    <p:sldId id="266" r:id="rId28"/>
+    <p:sldId id="267" r:id="rId29"/>
+    <p:sldId id="264" r:id="rId30"/>
+    <p:sldId id="268" r:id="rId31"/>
+    <p:sldId id="288" r:id="rId32"/>
   </p:sldIdLst>
   <p:sldSz cx="9144000" cy="6858000" type="screen4x3"/>
   <p:notesSz cx="6858000" cy="9144000"/>
@@ -3664,29 +3667,40 @@
           <a:p>
             <a:r>
               <a:rPr lang="fr-FR" b="1" dirty="0" smtClean="0"/>
+              <a:t>tern.java </a:t>
+            </a:r>
+            <a:r>
+              <a:rPr lang="fr-FR" dirty="0"/>
+              <a:t>est disponible sur </a:t>
+            </a:r>
+            <a:r>
+              <a:rPr lang="fr-FR" dirty="0">
+                <a:hlinkClick r:id="rId2"/>
+              </a:rPr>
+              <a:t>https://</a:t>
+            </a:r>
+            <a:r>
+              <a:rPr lang="fr-FR" dirty="0" smtClean="0">
+                <a:hlinkClick r:id="rId2"/>
+              </a:rPr>
+              <a:t>github.com/angelozerr/tern.java</a:t>
+            </a:r>
+            <a:endParaRPr lang="fr-FR" b="1" dirty="0" smtClean="0"/>
+          </a:p>
+          <a:p>
+            <a:r>
+              <a:rPr lang="fr-FR" b="1" dirty="0" smtClean="0"/>
               <a:t>tern.java</a:t>
             </a:r>
             <a:r>
               <a:rPr lang="fr-FR" dirty="0" smtClean="0"/>
-              <a:t> </a:t>
-            </a:r>
-            <a:r>
-              <a:rPr lang="fr-FR" dirty="0" smtClean="0"/>
-              <a:t>fournit un moteur d’inférence JavaScript dans un contexte Java.</a:t>
-            </a:r>
-          </a:p>
-          <a:p>
-            <a:r>
-              <a:rPr lang="fr-FR" dirty="0" smtClean="0"/>
-              <a:t>Il </a:t>
-            </a:r>
-            <a:r>
-              <a:rPr lang="fr-FR" dirty="0" err="1" smtClean="0"/>
-              <a:t>execute</a:t>
-            </a:r>
-            <a:r>
-              <a:rPr lang="fr-FR" dirty="0" smtClean="0"/>
-              <a:t> </a:t>
+              <a:t> fournit un moteur d’inférence JavaScript dans un contexte Java.</a:t>
+            </a:r>
+          </a:p>
+          <a:p>
+            <a:r>
+              <a:rPr lang="fr-FR" dirty="0" smtClean="0"/>
+              <a:t>Il exécute </a:t>
             </a:r>
             <a:r>
               <a:rPr lang="fr-FR" b="1" dirty="0" smtClean="0"/>
@@ -4048,7 +4062,7 @@
         <p:spPr/>
         <p:txBody>
           <a:bodyPr>
-            <a:normAutofit fontScale="92500" lnSpcReduction="10000"/>
+            <a:normAutofit fontScale="85000" lnSpcReduction="10000"/>
           </a:bodyPr>
           <a:lstStyle/>
           <a:p>
@@ -4094,7 +4108,7 @@
           <a:p>
             <a:r>
               <a:rPr lang="fr-FR" dirty="0" smtClean="0"/>
-              <a:t>Il est découpé en 3 parties : </a:t>
+              <a:t>Il est découpé en 4 grandes parties : </a:t>
             </a:r>
           </a:p>
           <a:p>
@@ -4119,12 +4133,24 @@
           <a:p>
             <a:pPr lvl="1"/>
             <a:r>
-              <a:rPr lang="fr-FR" dirty="0" err="1"/>
+              <a:rPr lang="fr-FR" dirty="0" err="1" smtClean="0"/>
+              <a:t>Tern</a:t>
+            </a:r>
+            <a:r>
+              <a:rPr lang="fr-FR" dirty="0" smtClean="0"/>
+              <a:t> - </a:t>
+            </a:r>
+            <a:r>
+              <a:rPr lang="fr-FR" dirty="0" err="1" smtClean="0"/>
               <a:t>Embed</a:t>
             </a:r>
             <a:r>
+              <a:rPr lang="fr-FR" dirty="0" smtClean="0"/>
+              <a:t> </a:t>
+            </a:r>
+            <a:r>
               <a:rPr lang="fr-FR" dirty="0"/>
-              <a:t> Node.js</a:t>
+              <a:t>Node.js</a:t>
             </a:r>
           </a:p>
           <a:p>
@@ -4137,6 +4163,22 @@
               <a:rPr lang="fr-FR" dirty="0" smtClean="0"/>
               <a:t> – JSDT</a:t>
             </a:r>
+          </a:p>
+          <a:p>
+            <a:pPr lvl="1"/>
+            <a:r>
+              <a:rPr lang="fr-FR" dirty="0" err="1" smtClean="0"/>
+              <a:t>Tern</a:t>
+            </a:r>
+            <a:r>
+              <a:rPr lang="fr-FR" dirty="0" smtClean="0"/>
+              <a:t> - </a:t>
+            </a:r>
+            <a:r>
+              <a:rPr lang="fr-FR" dirty="0" err="1" smtClean="0"/>
+              <a:t>Tooling</a:t>
+            </a:r>
+            <a:endParaRPr lang="fr-FR" dirty="0" smtClean="0"/>
           </a:p>
           <a:p>
             <a:r>
@@ -4220,6 +4262,279 @@
 </file>
 
 <file path=ppt/slides/slide13.xml><?xml version="1.0" encoding="utf-8"?>
+<p:sld xmlns:a="http://schemas.openxmlformats.org/drawingml/2006/main" xmlns:r="http://schemas.openxmlformats.org/officeDocument/2006/relationships" xmlns:p="http://schemas.openxmlformats.org/presentationml/2006/main">
+  <p:cSld>
+    <p:spTree>
+      <p:nvGrpSpPr>
+        <p:cNvPr id="1" name=""/>
+        <p:cNvGrpSpPr/>
+        <p:nvPr/>
+      </p:nvGrpSpPr>
+      <p:grpSpPr>
+        <a:xfrm>
+          <a:off x="0" y="0"/>
+          <a:ext cx="0" cy="0"/>
+          <a:chOff x="0" y="0"/>
+          <a:chExt cx="0" cy="0"/>
+        </a:xfrm>
+      </p:grpSpPr>
+      <p:sp>
+        <p:nvSpPr>
+          <p:cNvPr id="2" name="Titre 1"/>
+          <p:cNvSpPr>
+            <a:spLocks noGrp="1"/>
+          </p:cNvSpPr>
+          <p:nvPr>
+            <p:ph type="title"/>
+          </p:nvPr>
+        </p:nvSpPr>
+        <p:spPr/>
+        <p:txBody>
+          <a:bodyPr/>
+          <a:lstStyle/>
+          <a:p>
+            <a:r>
+              <a:rPr lang="fr-FR" dirty="0" err="1" smtClean="0"/>
+              <a:t>Tern</a:t>
+            </a:r>
+            <a:r>
+              <a:rPr lang="fr-FR" dirty="0"/>
+              <a:t> </a:t>
+            </a:r>
+            <a:r>
+              <a:rPr lang="fr-FR" dirty="0" smtClean="0"/>
+              <a:t>IDE</a:t>
+            </a:r>
+            <a:r>
+              <a:rPr lang="fr-FR" dirty="0" smtClean="0"/>
+              <a:t> - Installation</a:t>
+            </a:r>
+            <a:endParaRPr lang="fr-FR" dirty="0"/>
+          </a:p>
+        </p:txBody>
+      </p:sp>
+      <p:sp>
+        <p:nvSpPr>
+          <p:cNvPr id="3" name="Espace réservé du contenu 2"/>
+          <p:cNvSpPr>
+            <a:spLocks noGrp="1"/>
+          </p:cNvSpPr>
+          <p:nvPr>
+            <p:ph sz="quarter" idx="13"/>
+          </p:nvPr>
+        </p:nvSpPr>
+        <p:spPr/>
+        <p:txBody>
+          <a:bodyPr>
+            <a:normAutofit fontScale="92500" lnSpcReduction="20000"/>
+          </a:bodyPr>
+          <a:lstStyle/>
+          <a:p>
+            <a:r>
+              <a:rPr lang="fr-FR" dirty="0" smtClean="0"/>
+              <a:t>Marketplace </a:t>
+            </a:r>
+            <a:r>
+              <a:rPr lang="fr-FR" dirty="0"/>
+              <a:t>: </a:t>
+            </a:r>
+            <a:r>
+              <a:rPr lang="fr-FR" dirty="0">
+                <a:hlinkClick r:id="rId2"/>
+              </a:rPr>
+              <a:t>http://</a:t>
+            </a:r>
+            <a:r>
+              <a:rPr lang="fr-FR" dirty="0" smtClean="0">
+                <a:hlinkClick r:id="rId2"/>
+              </a:rPr>
+              <a:t>marketplace.eclipse.org/content/tern-eclipse-ide</a:t>
+            </a:r>
+            <a:endParaRPr lang="fr-FR" dirty="0" smtClean="0"/>
+          </a:p>
+          <a:p>
+            <a:r>
+              <a:rPr lang="fr-FR" dirty="0"/>
+              <a:t>Ou </a:t>
+            </a:r>
+            <a:r>
+              <a:rPr lang="fr-FR" dirty="0" smtClean="0"/>
+              <a:t>Update </a:t>
+            </a:r>
+            <a:r>
+              <a:rPr lang="fr-FR" dirty="0"/>
+              <a:t>site : </a:t>
+            </a:r>
+            <a:r>
+              <a:rPr lang="fr-FR" dirty="0">
+                <a:hlinkClick r:id="rId3"/>
+              </a:rPr>
+              <a:t>http://oss.opensagres.fr/tern.repository/0.4.0</a:t>
+            </a:r>
+            <a:r>
+              <a:rPr lang="fr-FR" dirty="0" smtClean="0">
+                <a:hlinkClick r:id="rId3"/>
+              </a:rPr>
+              <a:t>/</a:t>
+            </a:r>
+            <a:endParaRPr lang="fr-FR" dirty="0" smtClean="0"/>
+          </a:p>
+          <a:p>
+            <a:endParaRPr lang="fr-FR" dirty="0"/>
+          </a:p>
+          <a:p>
+            <a:endParaRPr lang="fr-FR" dirty="0" smtClean="0"/>
+          </a:p>
+          <a:p>
+            <a:endParaRPr lang="fr-FR" dirty="0"/>
+          </a:p>
+          <a:p>
+            <a:endParaRPr lang="fr-FR" dirty="0" smtClean="0"/>
+          </a:p>
+          <a:p>
+            <a:endParaRPr lang="fr-FR" dirty="0"/>
+          </a:p>
+          <a:p>
+            <a:endParaRPr lang="fr-FR" dirty="0" smtClean="0"/>
+          </a:p>
+          <a:p>
+            <a:endParaRPr lang="fr-FR" dirty="0"/>
+          </a:p>
+          <a:p>
+            <a:endParaRPr lang="fr-FR" dirty="0" smtClean="0"/>
+          </a:p>
+          <a:p>
+            <a:endParaRPr lang="fr-FR" dirty="0"/>
+          </a:p>
+          <a:p>
+            <a:pPr marL="0" indent="0">
+              <a:buNone/>
+            </a:pPr>
+            <a:r>
+              <a:rPr lang="fr-FR" dirty="0" smtClean="0">
+                <a:solidFill>
+                  <a:srgbClr val="FFC000"/>
+                </a:solidFill>
+              </a:rPr>
+              <a:t>►</a:t>
+            </a:r>
+            <a:r>
+              <a:rPr lang="fr-FR" dirty="0" smtClean="0"/>
+              <a:t>pour démarrer avec </a:t>
+            </a:r>
+            <a:r>
+              <a:rPr lang="fr-FR" dirty="0" err="1" smtClean="0"/>
+              <a:t>Tern</a:t>
+            </a:r>
+            <a:r>
+              <a:rPr lang="fr-FR" dirty="0"/>
+              <a:t> IDE : </a:t>
+            </a:r>
+            <a:r>
+              <a:rPr lang="fr-FR" dirty="0">
+                <a:hlinkClick r:id="rId4"/>
+              </a:rPr>
+              <a:t>https://</a:t>
+            </a:r>
+            <a:r>
+              <a:rPr lang="fr-FR" dirty="0" smtClean="0">
+                <a:hlinkClick r:id="rId4"/>
+              </a:rPr>
+              <a:t>github.com/angelozerr/tern.java/wiki/Getting-Started</a:t>
+            </a:r>
+            <a:endParaRPr lang="fr-FR" dirty="0" smtClean="0"/>
+          </a:p>
+          <a:p>
+            <a:pPr marL="0" indent="0">
+              <a:buNone/>
+            </a:pPr>
+            <a:endParaRPr lang="fr-FR" dirty="0"/>
+          </a:p>
+          <a:p>
+            <a:pPr marL="0" indent="0">
+              <a:buNone/>
+            </a:pPr>
+            <a:endParaRPr lang="fr-FR" dirty="0"/>
+          </a:p>
+          <a:p>
+            <a:endParaRPr lang="fr-FR" dirty="0" smtClean="0"/>
+          </a:p>
+          <a:p>
+            <a:endParaRPr lang="fr-FR" dirty="0" smtClean="0"/>
+          </a:p>
+          <a:p>
+            <a:endParaRPr lang="fr-FR" dirty="0" smtClean="0"/>
+          </a:p>
+        </p:txBody>
+      </p:sp>
+      <p:pic>
+        <p:nvPicPr>
+          <p:cNvPr id="8194" name="Picture 2"/>
+          <p:cNvPicPr>
+            <a:picLocks noChangeAspect="1" noChangeArrowheads="1"/>
+          </p:cNvPicPr>
+          <p:nvPr/>
+        </p:nvPicPr>
+        <p:blipFill>
+          <a:blip r:embed="rId5">
+            <a:extLst>
+              <a:ext uri="{28A0092B-C50C-407E-A947-70E740481C1C}">
+                <a14:useLocalDpi xmlns:a14="http://schemas.microsoft.com/office/drawing/2010/main" val="0"/>
+              </a:ext>
+            </a:extLst>
+          </a:blip>
+          <a:srcRect/>
+          <a:stretch>
+            <a:fillRect/>
+          </a:stretch>
+        </p:blipFill>
+        <p:spPr bwMode="auto">
+          <a:xfrm>
+            <a:off x="1403648" y="2204865"/>
+            <a:ext cx="5822968" cy="2864776"/>
+          </a:xfrm>
+          <a:prstGeom prst="rect">
+            <a:avLst/>
+          </a:prstGeom>
+          <a:noFill/>
+          <a:ln>
+            <a:noFill/>
+          </a:ln>
+          <a:extLst>
+            <a:ext uri="{909E8E84-426E-40DD-AFC4-6F175D3DCCD1}">
+              <a14:hiddenFill xmlns:a14="http://schemas.microsoft.com/office/drawing/2010/main">
+                <a:solidFill>
+                  <a:schemeClr val="accent1"/>
+                </a:solidFill>
+              </a14:hiddenFill>
+            </a:ext>
+            <a:ext uri="{91240B29-F687-4F45-9708-019B960494DF}">
+              <a14:hiddenLine xmlns:a14="http://schemas.microsoft.com/office/drawing/2010/main" w="9525">
+                <a:solidFill>
+                  <a:schemeClr val="tx1"/>
+                </a:solidFill>
+                <a:miter lim="800000"/>
+                <a:headEnd/>
+                <a:tailEnd/>
+              </a14:hiddenLine>
+            </a:ext>
+          </a:extLst>
+        </p:spPr>
+      </p:pic>
+    </p:spTree>
+    <p:extLst>
+      <p:ext uri="{BB962C8B-B14F-4D97-AF65-F5344CB8AC3E}">
+        <p14:creationId xmlns:p14="http://schemas.microsoft.com/office/powerpoint/2010/main" val="54981899"/>
+      </p:ext>
+    </p:extLst>
+  </p:cSld>
+  <p:clrMapOvr>
+    <a:masterClrMapping/>
+  </p:clrMapOvr>
+</p:sld>
+</file>
+
+<file path=ppt/slides/slide14.xml><?xml version="1.0" encoding="utf-8"?>
 <p:sld xmlns:a="http://schemas.openxmlformats.org/drawingml/2006/main" xmlns:r="http://schemas.openxmlformats.org/officeDocument/2006/relationships" xmlns:p="http://schemas.openxmlformats.org/presentationml/2006/main">
   <p:cSld>
     <p:spTree>
@@ -4405,7 +4720,7 @@
 </p:sld>
 </file>
 
-<file path=ppt/slides/slide14.xml><?xml version="1.0" encoding="utf-8"?>
+<file path=ppt/slides/slide15.xml><?xml version="1.0" encoding="utf-8"?>
 <p:sld xmlns:a="http://schemas.openxmlformats.org/drawingml/2006/main" xmlns:r="http://schemas.openxmlformats.org/officeDocument/2006/relationships" xmlns:p="http://schemas.openxmlformats.org/presentationml/2006/main">
   <p:cSld>
     <p:spTree>
@@ -4565,7 +4880,7 @@
 </p:sld>
 </file>
 
-<file path=ppt/slides/slide15.xml><?xml version="1.0" encoding="utf-8"?>
+<file path=ppt/slides/slide16.xml><?xml version="1.0" encoding="utf-8"?>
 <p:sld xmlns:a="http://schemas.openxmlformats.org/drawingml/2006/main" xmlns:r="http://schemas.openxmlformats.org/officeDocument/2006/relationships" xmlns:p="http://schemas.openxmlformats.org/presentationml/2006/main">
   <p:cSld>
     <p:spTree>
@@ -4732,7 +5047,7 @@
 </p:sld>
 </file>
 
-<file path=ppt/slides/slide16.xml><?xml version="1.0" encoding="utf-8"?>
+<file path=ppt/slides/slide17.xml><?xml version="1.0" encoding="utf-8"?>
 <p:sld xmlns:a="http://schemas.openxmlformats.org/drawingml/2006/main" xmlns:r="http://schemas.openxmlformats.org/officeDocument/2006/relationships" xmlns:p="http://schemas.openxmlformats.org/presentationml/2006/main">
   <p:cSld>
     <p:spTree>
@@ -4891,7 +5206,7 @@
 </p:sld>
 </file>
 
-<file path=ppt/slides/slide17.xml><?xml version="1.0" encoding="utf-8"?>
+<file path=ppt/slides/slide18.xml><?xml version="1.0" encoding="utf-8"?>
 <p:sld xmlns:a="http://schemas.openxmlformats.org/drawingml/2006/main" xmlns:r="http://schemas.openxmlformats.org/officeDocument/2006/relationships" xmlns:p="http://schemas.openxmlformats.org/presentationml/2006/main">
   <p:cSld>
     <p:spTree>
@@ -5069,7 +5384,7 @@
 </p:sld>
 </file>
 
-<file path=ppt/slides/slide18.xml><?xml version="1.0" encoding="utf-8"?>
+<file path=ppt/slides/slide19.xml><?xml version="1.0" encoding="utf-8"?>
 <p:sld xmlns:a="http://schemas.openxmlformats.org/drawingml/2006/main" xmlns:r="http://schemas.openxmlformats.org/officeDocument/2006/relationships" xmlns:p="http://schemas.openxmlformats.org/presentationml/2006/main">
   <p:cSld>
     <p:spTree>
@@ -5265,192 +5580,6 @@
 </p:sld>
 </file>
 
-<file path=ppt/slides/slide19.xml><?xml version="1.0" encoding="utf-8"?>
-<p:sld xmlns:a="http://schemas.openxmlformats.org/drawingml/2006/main" xmlns:r="http://schemas.openxmlformats.org/officeDocument/2006/relationships" xmlns:p="http://schemas.openxmlformats.org/presentationml/2006/main">
-  <p:cSld>
-    <p:spTree>
-      <p:nvGrpSpPr>
-        <p:cNvPr id="1" name=""/>
-        <p:cNvGrpSpPr/>
-        <p:nvPr/>
-      </p:nvGrpSpPr>
-      <p:grpSpPr>
-        <a:xfrm>
-          <a:off x="0" y="0"/>
-          <a:ext cx="0" cy="0"/>
-          <a:chOff x="0" y="0"/>
-          <a:chExt cx="0" cy="0"/>
-        </a:xfrm>
-      </p:grpSpPr>
-      <p:sp>
-        <p:nvSpPr>
-          <p:cNvPr id="2" name="Titre 1"/>
-          <p:cNvSpPr>
-            <a:spLocks noGrp="1"/>
-          </p:cNvSpPr>
-          <p:nvPr>
-            <p:ph type="title"/>
-          </p:nvPr>
-        </p:nvSpPr>
-        <p:spPr/>
-        <p:txBody>
-          <a:bodyPr/>
-          <a:lstStyle/>
-          <a:p>
-            <a:r>
-              <a:rPr lang="fr-FR" dirty="0" smtClean="0"/>
-              <a:t>TERN.java – Comment ca marche?</a:t>
-            </a:r>
-            <a:endParaRPr lang="fr-FR" dirty="0"/>
-          </a:p>
-        </p:txBody>
-      </p:sp>
-      <p:sp>
-        <p:nvSpPr>
-          <p:cNvPr id="3" name="Espace réservé du contenu 2"/>
-          <p:cNvSpPr>
-            <a:spLocks noGrp="1"/>
-          </p:cNvSpPr>
-          <p:nvPr>
-            <p:ph sz="quarter" idx="13"/>
-          </p:nvPr>
-        </p:nvSpPr>
-        <p:spPr/>
-        <p:txBody>
-          <a:bodyPr>
-            <a:normAutofit/>
-          </a:bodyPr>
-          <a:lstStyle/>
-          <a:p>
-            <a:pPr marL="342900" lvl="1" indent="-342900"/>
-            <a:r>
-              <a:rPr lang="fr-FR" dirty="0" smtClean="0"/>
-              <a:t>TODO : faire </a:t>
-            </a:r>
-            <a:r>
-              <a:rPr lang="fr-FR" dirty="0" err="1" smtClean="0"/>
-              <a:t>schema</a:t>
-            </a:r>
-            <a:r>
-              <a:rPr lang="fr-FR" dirty="0" smtClean="0"/>
-              <a:t> avec </a:t>
-            </a:r>
-            <a:r>
-              <a:rPr lang="fr-FR" dirty="0" err="1" smtClean="0"/>
-              <a:t>Completion</a:t>
-            </a:r>
-            <a:r>
-              <a:rPr lang="fr-FR" dirty="0" smtClean="0"/>
-              <a:t> &lt;-&gt; </a:t>
-            </a:r>
-            <a:r>
-              <a:rPr lang="fr-FR" dirty="0" err="1" smtClean="0"/>
-              <a:t>Tern</a:t>
-            </a:r>
-            <a:r>
-              <a:rPr lang="fr-FR" dirty="0" smtClean="0"/>
-              <a:t> Server</a:t>
-            </a:r>
-          </a:p>
-          <a:p>
-            <a:pPr marL="342900" lvl="1" indent="-342900"/>
-            <a:r>
-              <a:rPr lang="fr-FR" dirty="0"/>
-              <a:t>TODO : faire </a:t>
-            </a:r>
-            <a:r>
-              <a:rPr lang="fr-FR" dirty="0" err="1"/>
-              <a:t>schema</a:t>
-            </a:r>
-            <a:r>
-              <a:rPr lang="fr-FR" dirty="0"/>
-              <a:t> avec </a:t>
-            </a:r>
-            <a:r>
-              <a:rPr lang="fr-FR" dirty="0" err="1"/>
-              <a:t>Completion</a:t>
-            </a:r>
-            <a:r>
-              <a:rPr lang="fr-FR" dirty="0"/>
-              <a:t> &lt;-&gt; </a:t>
-            </a:r>
-            <a:r>
-              <a:rPr lang="fr-FR" dirty="0" err="1"/>
-              <a:t>Tern</a:t>
-            </a:r>
-            <a:r>
-              <a:rPr lang="fr-FR" dirty="0"/>
-              <a:t> </a:t>
-            </a:r>
-            <a:r>
-              <a:rPr lang="fr-FR" dirty="0" smtClean="0"/>
-              <a:t>Server qui tourne avec Node.js</a:t>
-            </a:r>
-            <a:endParaRPr lang="fr-FR" dirty="0"/>
-          </a:p>
-          <a:p>
-            <a:pPr marL="342900" lvl="1" indent="-342900"/>
-            <a:endParaRPr lang="fr-FR" dirty="0" smtClean="0"/>
-          </a:p>
-          <a:p>
-            <a:pPr marL="342900" lvl="1" indent="-342900"/>
-            <a:endParaRPr lang="fr-FR" dirty="0" smtClean="0"/>
-          </a:p>
-          <a:p>
-            <a:pPr marL="342900" lvl="1" indent="-342900"/>
-            <a:endParaRPr lang="fr-FR" dirty="0" smtClean="0"/>
-          </a:p>
-          <a:p>
-            <a:pPr marL="342900" lvl="1" indent="-342900"/>
-            <a:endParaRPr lang="fr-FR" dirty="0"/>
-          </a:p>
-          <a:p>
-            <a:pPr marL="342900" lvl="1" indent="-342900"/>
-            <a:endParaRPr lang="fr-FR" dirty="0" smtClean="0"/>
-          </a:p>
-          <a:p>
-            <a:pPr marL="342900" lvl="1" indent="-342900"/>
-            <a:endParaRPr lang="fr-FR" dirty="0"/>
-          </a:p>
-          <a:p>
-            <a:pPr marL="342900" lvl="1" indent="-342900"/>
-            <a:endParaRPr lang="fr-FR" dirty="0" smtClean="0"/>
-          </a:p>
-          <a:p>
-            <a:pPr marL="342900" lvl="1" indent="-342900"/>
-            <a:endParaRPr lang="fr-FR" dirty="0"/>
-          </a:p>
-          <a:p>
-            <a:pPr marL="342900" lvl="1" indent="-342900"/>
-            <a:endParaRPr lang="fr-FR" dirty="0" smtClean="0"/>
-          </a:p>
-          <a:p>
-            <a:pPr marL="342900" lvl="1" indent="-342900"/>
-            <a:endParaRPr lang="fr-FR" dirty="0"/>
-          </a:p>
-          <a:p>
-            <a:pPr marL="342900" lvl="1" indent="-342900"/>
-            <a:endParaRPr lang="fr-FR" dirty="0" smtClean="0"/>
-          </a:p>
-          <a:p>
-            <a:pPr marL="342900" lvl="1" indent="-342900"/>
-            <a:endParaRPr lang="fr-FR" dirty="0"/>
-          </a:p>
-        </p:txBody>
-      </p:sp>
-    </p:spTree>
-    <p:extLst>
-      <p:ext uri="{BB962C8B-B14F-4D97-AF65-F5344CB8AC3E}">
-        <p14:creationId xmlns:p14="http://schemas.microsoft.com/office/powerpoint/2010/main" val="102153736"/>
-      </p:ext>
-    </p:extLst>
-  </p:cSld>
-  <p:clrMapOvr>
-    <a:masterClrMapping/>
-  </p:clrMapOvr>
-</p:sld>
-</file>
-
 <file path=ppt/slides/slide2.xml><?xml version="1.0" encoding="utf-8"?>
 <p:sld xmlns:a="http://schemas.openxmlformats.org/drawingml/2006/main" xmlns:r="http://schemas.openxmlformats.org/officeDocument/2006/relationships" xmlns:p="http://schemas.openxmlformats.org/presentationml/2006/main">
   <p:cSld>
@@ -5761,7 +5890,7 @@
           <a:p>
             <a:r>
               <a:rPr lang="fr-FR" dirty="0" smtClean="0"/>
-              <a:t>Tern.js &amp; Java</a:t>
+              <a:t>TERN IDE &amp; Modules</a:t>
             </a:r>
             <a:endParaRPr lang="fr-FR" dirty="0"/>
           </a:p>
@@ -5780,134 +5909,140 @@
         <p:spPr/>
         <p:txBody>
           <a:bodyPr>
-            <a:normAutofit fontScale="92500" lnSpcReduction="10000"/>
+            <a:normAutofit/>
           </a:bodyPr>
           <a:lstStyle/>
           <a:p>
             <a:pPr marL="342900" lvl="1" indent="-342900"/>
             <a:r>
               <a:rPr lang="fr-FR" dirty="0" smtClean="0"/>
-              <a:t>tern.js écrits en </a:t>
-            </a:r>
-            <a:r>
-              <a:rPr lang="fr-FR" dirty="0" err="1" smtClean="0"/>
-              <a:t>Javascript</a:t>
-            </a:r>
-            <a:r>
-              <a:rPr lang="fr-FR" dirty="0" smtClean="0"/>
-              <a:t> doit être </a:t>
-            </a:r>
-            <a:r>
-              <a:rPr lang="fr-FR" dirty="0" err="1" smtClean="0"/>
-              <a:t>éxécutés</a:t>
-            </a:r>
-            <a:r>
-              <a:rPr lang="fr-FR" dirty="0" smtClean="0"/>
-              <a:t> dans un contexte Java, pour cela plusieurs solutions :</a:t>
-            </a:r>
-          </a:p>
-          <a:p>
-            <a:pPr marL="742950" lvl="2" indent="-342900"/>
-            <a:r>
-              <a:rPr lang="fr-FR" dirty="0" smtClean="0"/>
-              <a:t>Rhino, </a:t>
-            </a:r>
-          </a:p>
-          <a:p>
-            <a:pPr marL="742950" lvl="2" indent="-342900"/>
-            <a:r>
-              <a:rPr lang="fr-FR" dirty="0" smtClean="0"/>
-              <a:t>Node.js (client serveur), </a:t>
-            </a:r>
-          </a:p>
-          <a:p>
-            <a:pPr marL="742950" lvl="2" indent="-342900"/>
-            <a:r>
-              <a:rPr lang="fr-FR" dirty="0" err="1" smtClean="0"/>
-              <a:t>Nashhorm</a:t>
-            </a:r>
-            <a:r>
-              <a:rPr lang="fr-FR" dirty="0" smtClean="0"/>
-              <a:t>, </a:t>
-            </a:r>
-          </a:p>
-          <a:p>
-            <a:pPr marL="742950" lvl="2" indent="-342900"/>
-            <a:r>
-              <a:rPr lang="fr-FR" dirty="0" err="1" smtClean="0"/>
-              <a:t>Vertx</a:t>
-            </a:r>
+              <a:t>Après avoir </a:t>
+            </a:r>
+            <a:r>
+              <a:rPr lang="fr-FR" dirty="0"/>
+              <a:t>sélectionné le module </a:t>
+            </a:r>
+            <a:r>
+              <a:rPr lang="fr-FR" dirty="0" err="1"/>
+              <a:t>jquery</a:t>
+            </a:r>
+            <a:r>
+              <a:rPr lang="fr-FR" dirty="0" smtClean="0"/>
+              <a:t>, on bénéficie de la complétion sur ce </a:t>
+            </a:r>
+            <a:r>
+              <a:rPr lang="fr-FR" dirty="0" err="1" smtClean="0"/>
+              <a:t>framework</a:t>
+            </a:r>
+            <a:r>
+              <a:rPr lang="fr-FR" dirty="0" smtClean="0"/>
+              <a:t>: : </a:t>
+            </a:r>
+          </a:p>
+          <a:p>
+            <a:pPr marL="342900" lvl="1" indent="-342900"/>
             <a:endParaRPr lang="fr-FR" dirty="0" smtClean="0"/>
           </a:p>
           <a:p>
-            <a:pPr marL="742950" lvl="2" indent="-342900"/>
-            <a:r>
-              <a:rPr lang="fr-FR" dirty="0" smtClean="0"/>
-              <a:t>Chrome</a:t>
-            </a:r>
-          </a:p>
-          <a:p>
             <a:pPr marL="342900" lvl="1" indent="-342900"/>
-            <a:r>
-              <a:rPr lang="fr-FR" dirty="0" smtClean="0"/>
-              <a:t>2 </a:t>
-            </a:r>
-            <a:r>
-              <a:rPr lang="fr-FR" dirty="0" err="1" smtClean="0"/>
-              <a:t>implementations</a:t>
-            </a:r>
-            <a:r>
-              <a:rPr lang="fr-FR" dirty="0" smtClean="0"/>
-              <a:t> du serveur </a:t>
-            </a:r>
-            <a:r>
-              <a:rPr lang="fr-FR" dirty="0" err="1" smtClean="0"/>
-              <a:t>tern</a:t>
-            </a:r>
-            <a:r>
-              <a:rPr lang="fr-FR" dirty="0" smtClean="0"/>
-              <a:t> en Java : </a:t>
-            </a:r>
-          </a:p>
-          <a:p>
-            <a:pPr marL="742950" lvl="2" indent="-342900"/>
-            <a:r>
-              <a:rPr lang="fr-FR" dirty="0" smtClean="0"/>
-              <a:t>Rhino</a:t>
-            </a:r>
-          </a:p>
-          <a:p>
-            <a:pPr marL="742950" lvl="2" indent="-342900"/>
-            <a:r>
-              <a:rPr lang="fr-FR" dirty="0" smtClean="0"/>
-              <a:t>Node.js</a:t>
-            </a:r>
+            <a:endParaRPr lang="fr-FR" dirty="0" smtClean="0"/>
           </a:p>
           <a:p>
             <a:pPr marL="342900" lvl="1" indent="-342900"/>
-            <a:r>
-              <a:rPr lang="fr-FR" dirty="0" smtClean="0"/>
-              <a:t>Node.js la plus performante.</a:t>
-            </a:r>
+            <a:endParaRPr lang="fr-FR" dirty="0"/>
           </a:p>
           <a:p>
             <a:pPr marL="342900" lvl="1" indent="-342900"/>
-            <a:r>
-              <a:rPr lang="fr-FR" dirty="0"/>
-              <a:t>A tester avec </a:t>
-            </a:r>
-            <a:r>
-              <a:rPr lang="fr-FR" dirty="0" err="1"/>
-              <a:t>Nashhorm</a:t>
-            </a:r>
             <a:endParaRPr lang="fr-FR" dirty="0" smtClean="0"/>
           </a:p>
-        </p:txBody>
-      </p:sp>
+          <a:p>
+            <a:pPr marL="342900" lvl="1" indent="-342900"/>
+            <a:endParaRPr lang="fr-FR" dirty="0"/>
+          </a:p>
+          <a:p>
+            <a:pPr marL="342900" lvl="1" indent="-342900"/>
+            <a:endParaRPr lang="fr-FR" dirty="0" smtClean="0"/>
+          </a:p>
+          <a:p>
+            <a:pPr marL="342900" lvl="1" indent="-342900"/>
+            <a:endParaRPr lang="fr-FR" dirty="0"/>
+          </a:p>
+          <a:p>
+            <a:pPr marL="342900" lvl="1" indent="-342900"/>
+            <a:endParaRPr lang="fr-FR" dirty="0" smtClean="0"/>
+          </a:p>
+          <a:p>
+            <a:pPr marL="342900" lvl="1" indent="-342900"/>
+            <a:endParaRPr lang="fr-FR" dirty="0"/>
+          </a:p>
+          <a:p>
+            <a:pPr marL="342900" lvl="1" indent="-342900"/>
+            <a:endParaRPr lang="fr-FR" dirty="0" smtClean="0"/>
+          </a:p>
+          <a:p>
+            <a:pPr marL="342900" lvl="1" indent="-342900"/>
+            <a:endParaRPr lang="fr-FR" dirty="0"/>
+          </a:p>
+        </p:txBody>
+      </p:sp>
+      <p:pic>
+        <p:nvPicPr>
+          <p:cNvPr id="7170" name="Picture 2"/>
+          <p:cNvPicPr>
+            <a:picLocks noChangeAspect="1" noChangeArrowheads="1"/>
+          </p:cNvPicPr>
+          <p:nvPr/>
+        </p:nvPicPr>
+        <p:blipFill>
+          <a:blip r:embed="rId2">
+            <a:extLst>
+              <a:ext uri="{28A0092B-C50C-407E-A947-70E740481C1C}">
+                <a14:useLocalDpi xmlns:a14="http://schemas.microsoft.com/office/drawing/2010/main" val="0"/>
+              </a:ext>
+            </a:extLst>
+          </a:blip>
+          <a:srcRect/>
+          <a:stretch>
+            <a:fillRect/>
+          </a:stretch>
+        </p:blipFill>
+        <p:spPr bwMode="auto">
+          <a:xfrm>
+            <a:off x="611560" y="2187573"/>
+            <a:ext cx="7780101" cy="3113633"/>
+          </a:xfrm>
+          <a:prstGeom prst="rect">
+            <a:avLst/>
+          </a:prstGeom>
+          <a:noFill/>
+          <a:ln>
+            <a:noFill/>
+          </a:ln>
+          <a:extLst>
+            <a:ext uri="{909E8E84-426E-40DD-AFC4-6F175D3DCCD1}">
+              <a14:hiddenFill xmlns:a14="http://schemas.microsoft.com/office/drawing/2010/main">
+                <a:solidFill>
+                  <a:schemeClr val="accent1"/>
+                </a:solidFill>
+              </a14:hiddenFill>
+            </a:ext>
+            <a:ext uri="{91240B29-F687-4F45-9708-019B960494DF}">
+              <a14:hiddenLine xmlns:a14="http://schemas.microsoft.com/office/drawing/2010/main" w="9525">
+                <a:solidFill>
+                  <a:schemeClr val="tx1"/>
+                </a:solidFill>
+                <a:miter lim="800000"/>
+                <a:headEnd/>
+                <a:tailEnd/>
+              </a14:hiddenLine>
+            </a:ext>
+          </a:extLst>
+        </p:spPr>
+      </p:pic>
     </p:spTree>
     <p:extLst>
       <p:ext uri="{BB962C8B-B14F-4D97-AF65-F5344CB8AC3E}">
-        <p14:creationId xmlns:p14="http://schemas.microsoft.com/office/powerpoint/2010/main" val="3134940998"/>
+        <p14:creationId xmlns:p14="http://schemas.microsoft.com/office/powerpoint/2010/main" val="2134260514"/>
       </p:ext>
     </p:extLst>
   </p:cSld>
@@ -5951,7 +6086,7 @@
           <a:p>
             <a:r>
               <a:rPr lang="fr-FR" dirty="0" smtClean="0"/>
-              <a:t>Tern.js &amp; Java – Node.js</a:t>
+              <a:t>TERN.java – Comment ca marche?</a:t>
             </a:r>
             <a:endParaRPr lang="fr-FR" dirty="0"/>
           </a:p>
@@ -5977,7 +6112,7 @@
             <a:pPr marL="342900" lvl="1" indent="-342900"/>
             <a:r>
               <a:rPr lang="fr-FR" dirty="0" smtClean="0"/>
-              <a:t>Faire </a:t>
+              <a:t>TODO : faire </a:t>
             </a:r>
             <a:r>
               <a:rPr lang="fr-FR" dirty="0" err="1" smtClean="0"/>
@@ -5985,15 +6120,115 @@
             </a:r>
             <a:r>
               <a:rPr lang="fr-FR" dirty="0" smtClean="0"/>
-              <a:t> Node.js</a:t>
-            </a:r>
+              <a:t> avec </a:t>
+            </a:r>
+            <a:r>
+              <a:rPr lang="fr-FR" dirty="0" err="1" smtClean="0"/>
+              <a:t>Completion</a:t>
+            </a:r>
+            <a:r>
+              <a:rPr lang="fr-FR" dirty="0" smtClean="0"/>
+              <a:t> &lt;-&gt; </a:t>
+            </a:r>
+            <a:r>
+              <a:rPr lang="fr-FR" dirty="0" err="1" smtClean="0"/>
+              <a:t>Tern</a:t>
+            </a:r>
+            <a:r>
+              <a:rPr lang="fr-FR" dirty="0" smtClean="0"/>
+              <a:t> Server</a:t>
+            </a:r>
+          </a:p>
+          <a:p>
+            <a:pPr marL="342900" lvl="1" indent="-342900"/>
+            <a:r>
+              <a:rPr lang="fr-FR" dirty="0"/>
+              <a:t>TODO : faire </a:t>
+            </a:r>
+            <a:r>
+              <a:rPr lang="fr-FR" dirty="0" err="1"/>
+              <a:t>schema</a:t>
+            </a:r>
+            <a:r>
+              <a:rPr lang="fr-FR" dirty="0"/>
+              <a:t> avec </a:t>
+            </a:r>
+            <a:r>
+              <a:rPr lang="fr-FR" dirty="0" err="1"/>
+              <a:t>Completion</a:t>
+            </a:r>
+            <a:r>
+              <a:rPr lang="fr-FR" dirty="0"/>
+              <a:t> &lt;-&gt; </a:t>
+            </a:r>
+            <a:r>
+              <a:rPr lang="fr-FR" dirty="0" err="1"/>
+              <a:t>Tern</a:t>
+            </a:r>
+            <a:r>
+              <a:rPr lang="fr-FR" dirty="0"/>
+              <a:t> </a:t>
+            </a:r>
+            <a:r>
+              <a:rPr lang="fr-FR" dirty="0" smtClean="0"/>
+              <a:t>Server qui tourne avec Node.js</a:t>
+            </a:r>
+            <a:endParaRPr lang="fr-FR" dirty="0"/>
+          </a:p>
+          <a:p>
+            <a:pPr marL="342900" lvl="1" indent="-342900"/>
+            <a:endParaRPr lang="fr-FR" dirty="0" smtClean="0"/>
+          </a:p>
+          <a:p>
+            <a:pPr marL="342900" lvl="1" indent="-342900"/>
+            <a:endParaRPr lang="fr-FR" dirty="0" smtClean="0"/>
+          </a:p>
+          <a:p>
+            <a:pPr marL="342900" lvl="1" indent="-342900"/>
+            <a:endParaRPr lang="fr-FR" dirty="0" smtClean="0"/>
+          </a:p>
+          <a:p>
+            <a:pPr marL="342900" lvl="1" indent="-342900"/>
+            <a:endParaRPr lang="fr-FR" dirty="0"/>
+          </a:p>
+          <a:p>
+            <a:pPr marL="342900" lvl="1" indent="-342900"/>
+            <a:endParaRPr lang="fr-FR" dirty="0" smtClean="0"/>
+          </a:p>
+          <a:p>
+            <a:pPr marL="342900" lvl="1" indent="-342900"/>
+            <a:endParaRPr lang="fr-FR" dirty="0"/>
+          </a:p>
+          <a:p>
+            <a:pPr marL="342900" lvl="1" indent="-342900"/>
+            <a:endParaRPr lang="fr-FR" dirty="0" smtClean="0"/>
+          </a:p>
+          <a:p>
+            <a:pPr marL="342900" lvl="1" indent="-342900"/>
+            <a:endParaRPr lang="fr-FR" dirty="0"/>
+          </a:p>
+          <a:p>
+            <a:pPr marL="342900" lvl="1" indent="-342900"/>
+            <a:endParaRPr lang="fr-FR" dirty="0" smtClean="0"/>
+          </a:p>
+          <a:p>
+            <a:pPr marL="342900" lvl="1" indent="-342900"/>
+            <a:endParaRPr lang="fr-FR" dirty="0"/>
+          </a:p>
+          <a:p>
+            <a:pPr marL="342900" lvl="1" indent="-342900"/>
+            <a:endParaRPr lang="fr-FR" dirty="0" smtClean="0"/>
+          </a:p>
+          <a:p>
+            <a:pPr marL="342900" lvl="1" indent="-342900"/>
+            <a:endParaRPr lang="fr-FR" dirty="0"/>
           </a:p>
         </p:txBody>
       </p:sp>
     </p:spTree>
     <p:extLst>
       <p:ext uri="{BB962C8B-B14F-4D97-AF65-F5344CB8AC3E}">
-        <p14:creationId xmlns:p14="http://schemas.microsoft.com/office/powerpoint/2010/main" val="1152627646"/>
+        <p14:creationId xmlns:p14="http://schemas.microsoft.com/office/powerpoint/2010/main" val="102153736"/>
       </p:ext>
     </p:extLst>
   </p:cSld>
@@ -6037,11 +6272,7 @@
           <a:p>
             <a:r>
               <a:rPr lang="fr-FR" dirty="0" smtClean="0"/>
-              <a:t>Tern.java </a:t>
-            </a:r>
-            <a:r>
-              <a:rPr lang="fr-FR" smtClean="0"/>
-              <a:t>&amp; Eclipse</a:t>
+              <a:t>Tern.js &amp; Java</a:t>
             </a:r>
             <a:endParaRPr lang="fr-FR" dirty="0"/>
           </a:p>
@@ -6059,74 +6290,86 @@
         </p:nvSpPr>
         <p:spPr/>
         <p:txBody>
-          <a:bodyPr/>
-          <a:lstStyle/>
-          <a:p>
-            <a:r>
-              <a:rPr lang="fr-FR" dirty="0" smtClean="0"/>
-              <a:t>tern.java (</a:t>
-            </a:r>
-            <a:r>
-              <a:rPr lang="fr-FR" dirty="0" err="1" smtClean="0"/>
-              <a:t>eclipse</a:t>
-            </a:r>
-            <a:r>
-              <a:rPr lang="fr-FR" dirty="0" smtClean="0"/>
-              <a:t>) fournit :</a:t>
-            </a:r>
-          </a:p>
-          <a:p>
-            <a:pPr lvl="1"/>
-            <a:r>
-              <a:rPr lang="fr-FR" dirty="0" smtClean="0"/>
-              <a:t>des plugins Eclipse pour l’IDE Eclipse qui utilise tern.java (</a:t>
-            </a:r>
-            <a:r>
-              <a:rPr lang="fr-FR" dirty="0" err="1" smtClean="0"/>
-              <a:t>core</a:t>
-            </a:r>
-            <a:r>
-              <a:rPr lang="fr-FR" dirty="0" smtClean="0"/>
-              <a:t>)</a:t>
-            </a:r>
-          </a:p>
-          <a:p>
-            <a:pPr lvl="1"/>
-            <a:r>
-              <a:rPr lang="fr-FR" dirty="0" smtClean="0"/>
-              <a:t>Un plugin JSDT qui </a:t>
-            </a:r>
-            <a:r>
-              <a:rPr lang="fr-FR" dirty="0" err="1" smtClean="0"/>
-              <a:t>éténd</a:t>
-            </a:r>
-            <a:r>
-              <a:rPr lang="fr-FR" dirty="0" smtClean="0"/>
-              <a:t> la </a:t>
-            </a:r>
-            <a:r>
-              <a:rPr lang="fr-FR" dirty="0" err="1" smtClean="0"/>
-              <a:t>completion</a:t>
+          <a:bodyPr>
+            <a:normAutofit fontScale="92500" lnSpcReduction="10000"/>
+          </a:bodyPr>
+          <a:lstStyle/>
+          <a:p>
+            <a:pPr marL="342900" lvl="1" indent="-342900"/>
+            <a:r>
+              <a:rPr lang="fr-FR" dirty="0" smtClean="0"/>
+              <a:t>tern.js écrits en </a:t>
+            </a:r>
+            <a:r>
+              <a:rPr lang="fr-FR" dirty="0" err="1" smtClean="0"/>
+              <a:t>Javascript</a:t>
+            </a:r>
+            <a:r>
+              <a:rPr lang="fr-FR" dirty="0" smtClean="0"/>
+              <a:t> doit être </a:t>
+            </a:r>
+            <a:r>
+              <a:rPr lang="fr-FR" dirty="0" err="1" smtClean="0"/>
+              <a:t>éxécutés</a:t>
+            </a:r>
+            <a:r>
+              <a:rPr lang="fr-FR" dirty="0" smtClean="0"/>
+              <a:t> dans un contexte Java, pour cela plusieurs solutions :</a:t>
+            </a:r>
+          </a:p>
+          <a:p>
+            <a:pPr marL="742950" lvl="2" indent="-342900"/>
+            <a:r>
+              <a:rPr lang="fr-FR" dirty="0" smtClean="0"/>
+              <a:t>Rhino, </a:t>
+            </a:r>
+          </a:p>
+          <a:p>
+            <a:pPr marL="742950" lvl="2" indent="-342900"/>
+            <a:r>
+              <a:rPr lang="fr-FR" dirty="0" smtClean="0"/>
+              <a:t>Node.js (client serveur), </a:t>
+            </a:r>
+          </a:p>
+          <a:p>
+            <a:pPr marL="742950" lvl="2" indent="-342900"/>
+            <a:r>
+              <a:rPr lang="fr-FR" dirty="0" err="1" smtClean="0"/>
+              <a:t>Nashhorm</a:t>
             </a:r>
             <a:r>
               <a:rPr lang="fr-FR" dirty="0" smtClean="0"/>
               <a:t>, </a:t>
             </a:r>
-            <a:r>
-              <a:rPr lang="fr-FR" dirty="0" err="1" smtClean="0"/>
-              <a:t>text</a:t>
-            </a:r>
-            <a:r>
-              <a:rPr lang="fr-FR" dirty="0" smtClean="0"/>
-              <a:t> </a:t>
-            </a:r>
-            <a:r>
-              <a:rPr lang="fr-FR" dirty="0" err="1" smtClean="0"/>
-              <a:t>hover</a:t>
-            </a:r>
-            <a:r>
-              <a:rPr lang="fr-FR" dirty="0" smtClean="0"/>
-              <a:t> pour utilise </a:t>
+          </a:p>
+          <a:p>
+            <a:pPr marL="742950" lvl="2" indent="-342900"/>
+            <a:r>
+              <a:rPr lang="fr-FR" dirty="0" err="1" smtClean="0"/>
+              <a:t>Vertx</a:t>
+            </a:r>
+            <a:endParaRPr lang="fr-FR" dirty="0" smtClean="0"/>
+          </a:p>
+          <a:p>
+            <a:pPr marL="742950" lvl="2" indent="-342900"/>
+            <a:r>
+              <a:rPr lang="fr-FR" dirty="0" smtClean="0"/>
+              <a:t>Chrome</a:t>
+            </a:r>
+          </a:p>
+          <a:p>
+            <a:pPr marL="342900" lvl="1" indent="-342900"/>
+            <a:r>
+              <a:rPr lang="fr-FR" dirty="0" smtClean="0"/>
+              <a:t>2 </a:t>
+            </a:r>
+            <a:r>
+              <a:rPr lang="fr-FR" dirty="0" err="1" smtClean="0"/>
+              <a:t>implementations</a:t>
+            </a:r>
+            <a:r>
+              <a:rPr lang="fr-FR" dirty="0" smtClean="0"/>
+              <a:t> du serveur </a:t>
             </a:r>
             <a:r>
               <a:rPr lang="fr-FR" dirty="0" err="1" smtClean="0"/>
@@ -6134,49 +6377,48 @@
             </a:r>
             <a:r>
               <a:rPr lang="fr-FR" dirty="0" smtClean="0"/>
-              <a:t> dans l’</a:t>
-            </a:r>
-            <a:r>
-              <a:rPr lang="fr-FR" dirty="0" err="1" smtClean="0"/>
-              <a:t>editeur</a:t>
-            </a:r>
-            <a:r>
-              <a:rPr lang="fr-FR" dirty="0" smtClean="0"/>
-              <a:t> </a:t>
-            </a:r>
-            <a:r>
-              <a:rPr lang="fr-FR" dirty="0" err="1" smtClean="0"/>
-              <a:t>Javascript</a:t>
-            </a:r>
-            <a:r>
-              <a:rPr lang="fr-FR" dirty="0" smtClean="0"/>
-              <a:t> JSDT</a:t>
-            </a:r>
-          </a:p>
-          <a:p>
-            <a:pPr lvl="1"/>
-            <a:r>
-              <a:rPr lang="fr-FR" dirty="0" smtClean="0"/>
-              <a:t>Tern.java (</a:t>
-            </a:r>
-            <a:r>
-              <a:rPr lang="fr-FR" dirty="0" err="1" smtClean="0"/>
-              <a:t>eclipse</a:t>
-            </a:r>
-            <a:r>
-              <a:rPr lang="fr-FR" dirty="0" smtClean="0"/>
-              <a:t>) n’est pas lié à JSDT, il peut être utilisé dans d’autres éditeurs JavaScript.</a:t>
-            </a:r>
-          </a:p>
-          <a:p>
-            <a:endParaRPr lang="fr-FR" dirty="0"/>
+              <a:t> en Java : </a:t>
+            </a:r>
+          </a:p>
+          <a:p>
+            <a:pPr marL="742950" lvl="2" indent="-342900"/>
+            <a:r>
+              <a:rPr lang="fr-FR" dirty="0" smtClean="0"/>
+              <a:t>Rhino</a:t>
+            </a:r>
+          </a:p>
+          <a:p>
+            <a:pPr marL="742950" lvl="2" indent="-342900"/>
+            <a:r>
+              <a:rPr lang="fr-FR" dirty="0" smtClean="0"/>
+              <a:t>Node.js</a:t>
+            </a:r>
+          </a:p>
+          <a:p>
+            <a:pPr marL="342900" lvl="1" indent="-342900"/>
+            <a:r>
+              <a:rPr lang="fr-FR" dirty="0" smtClean="0"/>
+              <a:t>Node.js la plus performante.</a:t>
+            </a:r>
+          </a:p>
+          <a:p>
+            <a:pPr marL="342900" lvl="1" indent="-342900"/>
+            <a:r>
+              <a:rPr lang="fr-FR" dirty="0"/>
+              <a:t>A tester avec </a:t>
+            </a:r>
+            <a:r>
+              <a:rPr lang="fr-FR" dirty="0" err="1"/>
+              <a:t>Nashhorm</a:t>
+            </a:r>
+            <a:endParaRPr lang="fr-FR" dirty="0" smtClean="0"/>
           </a:p>
         </p:txBody>
       </p:sp>
     </p:spTree>
     <p:extLst>
       <p:ext uri="{BB962C8B-B14F-4D97-AF65-F5344CB8AC3E}">
-        <p14:creationId xmlns:p14="http://schemas.microsoft.com/office/powerpoint/2010/main" val="3541111988"/>
+        <p14:creationId xmlns:p14="http://schemas.microsoft.com/office/powerpoint/2010/main" val="3134940998"/>
       </p:ext>
     </p:extLst>
   </p:cSld>
@@ -6220,19 +6462,7 @@
           <a:p>
             <a:r>
               <a:rPr lang="fr-FR" dirty="0" smtClean="0"/>
-              <a:t>Tern.java – </a:t>
-            </a:r>
-            <a:r>
-              <a:rPr lang="fr-FR" dirty="0" err="1" smtClean="0"/>
-              <a:t>Getting</a:t>
-            </a:r>
-            <a:r>
-              <a:rPr lang="fr-FR" dirty="0" smtClean="0"/>
-              <a:t> </a:t>
-            </a:r>
-            <a:r>
-              <a:rPr lang="fr-FR" dirty="0" err="1" smtClean="0"/>
-              <a:t>Started</a:t>
+              <a:t>Tern.js &amp; Java – Node.js</a:t>
             </a:r>
             <a:endParaRPr lang="fr-FR" dirty="0"/>
           </a:p>
@@ -6250,21 +6480,31 @@
         </p:nvSpPr>
         <p:spPr/>
         <p:txBody>
-          <a:bodyPr/>
-          <a:lstStyle/>
-          <a:p>
-            <a:r>
-              <a:rPr lang="fr-FR" dirty="0" smtClean="0"/>
-              <a:t>tern.java</a:t>
-            </a:r>
-            <a:endParaRPr lang="fr-FR" dirty="0"/>
+          <a:bodyPr>
+            <a:normAutofit/>
+          </a:bodyPr>
+          <a:lstStyle/>
+          <a:p>
+            <a:pPr marL="342900" lvl="1" indent="-342900"/>
+            <a:r>
+              <a:rPr lang="fr-FR" dirty="0" smtClean="0"/>
+              <a:t>Faire </a:t>
+            </a:r>
+            <a:r>
+              <a:rPr lang="fr-FR" dirty="0" err="1" smtClean="0"/>
+              <a:t>schema</a:t>
+            </a:r>
+            <a:r>
+              <a:rPr lang="fr-FR" dirty="0" smtClean="0"/>
+              <a:t> Node.js</a:t>
+            </a:r>
           </a:p>
         </p:txBody>
       </p:sp>
     </p:spTree>
     <p:extLst>
       <p:ext uri="{BB962C8B-B14F-4D97-AF65-F5344CB8AC3E}">
-        <p14:creationId xmlns:p14="http://schemas.microsoft.com/office/powerpoint/2010/main" val="1307568318"/>
+        <p14:creationId xmlns:p14="http://schemas.microsoft.com/office/powerpoint/2010/main" val="1152627646"/>
       </p:ext>
     </p:extLst>
   </p:cSld>
@@ -6308,11 +6548,11 @@
           <a:p>
             <a:r>
               <a:rPr lang="fr-FR" dirty="0" smtClean="0"/>
-              <a:t>Tern.java – </a:t>
-            </a:r>
-            <a:r>
-              <a:rPr lang="fr-FR" dirty="0" err="1" smtClean="0"/>
-              <a:t>Completion</a:t>
+              <a:t>Tern.java </a:t>
+            </a:r>
+            <a:r>
+              <a:rPr lang="fr-FR" smtClean="0"/>
+              <a:t>&amp; Eclipse</a:t>
             </a:r>
             <a:endParaRPr lang="fr-FR" dirty="0"/>
           </a:p>
@@ -6332,6 +6572,113 @@
         <p:txBody>
           <a:bodyPr/>
           <a:lstStyle/>
+          <a:p>
+            <a:r>
+              <a:rPr lang="fr-FR" dirty="0" smtClean="0"/>
+              <a:t>tern.java (</a:t>
+            </a:r>
+            <a:r>
+              <a:rPr lang="fr-FR" dirty="0" err="1" smtClean="0"/>
+              <a:t>eclipse</a:t>
+            </a:r>
+            <a:r>
+              <a:rPr lang="fr-FR" dirty="0" smtClean="0"/>
+              <a:t>) fournit :</a:t>
+            </a:r>
+          </a:p>
+          <a:p>
+            <a:pPr lvl="1"/>
+            <a:r>
+              <a:rPr lang="fr-FR" dirty="0" smtClean="0"/>
+              <a:t>des plugins Eclipse pour l’IDE Eclipse qui utilise tern.java (</a:t>
+            </a:r>
+            <a:r>
+              <a:rPr lang="fr-FR" dirty="0" err="1" smtClean="0"/>
+              <a:t>core</a:t>
+            </a:r>
+            <a:r>
+              <a:rPr lang="fr-FR" dirty="0" smtClean="0"/>
+              <a:t>)</a:t>
+            </a:r>
+          </a:p>
+          <a:p>
+            <a:pPr lvl="1"/>
+            <a:r>
+              <a:rPr lang="fr-FR" dirty="0" smtClean="0"/>
+              <a:t>Un plugin JSDT qui </a:t>
+            </a:r>
+            <a:r>
+              <a:rPr lang="fr-FR" dirty="0" err="1" smtClean="0"/>
+              <a:t>éténd</a:t>
+            </a:r>
+            <a:r>
+              <a:rPr lang="fr-FR" dirty="0" smtClean="0"/>
+              <a:t> la </a:t>
+            </a:r>
+            <a:r>
+              <a:rPr lang="fr-FR" dirty="0" err="1" smtClean="0"/>
+              <a:t>completion</a:t>
+            </a:r>
+            <a:r>
+              <a:rPr lang="fr-FR" dirty="0" smtClean="0"/>
+              <a:t>, </a:t>
+            </a:r>
+            <a:r>
+              <a:rPr lang="fr-FR" dirty="0" err="1" smtClean="0"/>
+              <a:t>text</a:t>
+            </a:r>
+            <a:r>
+              <a:rPr lang="fr-FR" dirty="0" smtClean="0"/>
+              <a:t> </a:t>
+            </a:r>
+            <a:r>
+              <a:rPr lang="fr-FR" dirty="0" err="1" smtClean="0"/>
+              <a:t>hover</a:t>
+            </a:r>
+            <a:r>
+              <a:rPr lang="fr-FR" dirty="0" smtClean="0"/>
+              <a:t> pour utilise </a:t>
+            </a:r>
+            <a:r>
+              <a:rPr lang="fr-FR" dirty="0" err="1" smtClean="0"/>
+              <a:t>tern</a:t>
+            </a:r>
+            <a:r>
+              <a:rPr lang="fr-FR" dirty="0" smtClean="0"/>
+              <a:t> dans l’</a:t>
+            </a:r>
+            <a:r>
+              <a:rPr lang="fr-FR" dirty="0" err="1" smtClean="0"/>
+              <a:t>editeur</a:t>
+            </a:r>
+            <a:r>
+              <a:rPr lang="fr-FR" dirty="0" smtClean="0"/>
+              <a:t> </a:t>
+            </a:r>
+            <a:r>
+              <a:rPr lang="fr-FR" dirty="0" err="1" smtClean="0"/>
+              <a:t>Javascript</a:t>
+            </a:r>
+            <a:r>
+              <a:rPr lang="fr-FR" dirty="0" smtClean="0"/>
+              <a:t> JSDT</a:t>
+            </a:r>
+          </a:p>
+          <a:p>
+            <a:pPr lvl="1"/>
+            <a:r>
+              <a:rPr lang="fr-FR" dirty="0" smtClean="0"/>
+              <a:t>Tern.java (</a:t>
+            </a:r>
+            <a:r>
+              <a:rPr lang="fr-FR" dirty="0" err="1" smtClean="0"/>
+              <a:t>eclipse</a:t>
+            </a:r>
+            <a:r>
+              <a:rPr lang="fr-FR" dirty="0" smtClean="0"/>
+              <a:t>) n’est pas lié à JSDT, il peut être utilisé dans d’autres éditeurs JavaScript.</a:t>
+            </a:r>
+          </a:p>
           <a:p>
             <a:endParaRPr lang="fr-FR" dirty="0"/>
           </a:p>
@@ -6340,7 +6687,7 @@
     </p:spTree>
     <p:extLst>
       <p:ext uri="{BB962C8B-B14F-4D97-AF65-F5344CB8AC3E}">
-        <p14:creationId xmlns:p14="http://schemas.microsoft.com/office/powerpoint/2010/main" val="606268164"/>
+        <p14:creationId xmlns:p14="http://schemas.microsoft.com/office/powerpoint/2010/main" val="3541111988"/>
       </p:ext>
     </p:extLst>
   </p:cSld>
@@ -6388,7 +6735,15 @@
             </a:r>
             <a:r>
               <a:rPr lang="fr-FR" dirty="0" err="1" smtClean="0"/>
-              <a:t>Hover</a:t>
+              <a:t>Getting</a:t>
+            </a:r>
+            <a:r>
+              <a:rPr lang="fr-FR" dirty="0" smtClean="0"/>
+              <a:t> </a:t>
+            </a:r>
+            <a:r>
+              <a:rPr lang="fr-FR" dirty="0" err="1" smtClean="0"/>
+              <a:t>Started</a:t>
             </a:r>
             <a:endParaRPr lang="fr-FR" dirty="0"/>
           </a:p>
@@ -6409,6 +6764,10 @@
           <a:bodyPr/>
           <a:lstStyle/>
           <a:p>
+            <a:r>
+              <a:rPr lang="fr-FR" dirty="0" smtClean="0"/>
+              <a:t>tern.java</a:t>
+            </a:r>
             <a:endParaRPr lang="fr-FR" dirty="0"/>
           </a:p>
         </p:txBody>
@@ -6416,7 +6775,7 @@
     </p:spTree>
     <p:extLst>
       <p:ext uri="{BB962C8B-B14F-4D97-AF65-F5344CB8AC3E}">
-        <p14:creationId xmlns:p14="http://schemas.microsoft.com/office/powerpoint/2010/main" val="1158840641"/>
+        <p14:creationId xmlns:p14="http://schemas.microsoft.com/office/powerpoint/2010/main" val="1307568318"/>
       </p:ext>
     </p:extLst>
   </p:cSld>
@@ -6460,7 +6819,11 @@
           <a:p>
             <a:r>
               <a:rPr lang="fr-FR" dirty="0" smtClean="0"/>
-              <a:t>Tern.java – Lint</a:t>
+              <a:t>Tern.java – </a:t>
+            </a:r>
+            <a:r>
+              <a:rPr lang="fr-FR" dirty="0" err="1" smtClean="0"/>
+              <a:t>Completion</a:t>
             </a:r>
             <a:endParaRPr lang="fr-FR" dirty="0"/>
           </a:p>
@@ -6488,7 +6851,7 @@
     </p:spTree>
     <p:extLst>
       <p:ext uri="{BB962C8B-B14F-4D97-AF65-F5344CB8AC3E}">
-        <p14:creationId xmlns:p14="http://schemas.microsoft.com/office/powerpoint/2010/main" val="1158840641"/>
+        <p14:creationId xmlns:p14="http://schemas.microsoft.com/office/powerpoint/2010/main" val="606268164"/>
       </p:ext>
     </p:extLst>
   </p:cSld>
@@ -6531,12 +6894,12 @@
           <a:lstStyle/>
           <a:p>
             <a:r>
-              <a:rPr lang="fr-FR" dirty="0" err="1" smtClean="0"/>
-              <a:t>AngularJS</a:t>
-            </a:r>
-            <a:r>
-              <a:rPr lang="fr-FR" dirty="0" smtClean="0"/>
-              <a:t> Eclipse</a:t>
+              <a:rPr lang="fr-FR" dirty="0" smtClean="0"/>
+              <a:t>Tern.java – </a:t>
+            </a:r>
+            <a:r>
+              <a:rPr lang="fr-FR" dirty="0" err="1" smtClean="0"/>
+              <a:t>Hover</a:t>
             </a:r>
             <a:endParaRPr lang="fr-FR" dirty="0"/>
           </a:p>
@@ -6557,10 +6920,6 @@
           <a:bodyPr/>
           <a:lstStyle/>
           <a:p>
-            <a:r>
-              <a:rPr lang="fr-FR" dirty="0" smtClean="0"/>
-              <a:t>tern.java</a:t>
-            </a:r>
             <a:endParaRPr lang="fr-FR" dirty="0"/>
           </a:p>
         </p:txBody>
@@ -6568,7 +6927,7 @@
     </p:spTree>
     <p:extLst>
       <p:ext uri="{BB962C8B-B14F-4D97-AF65-F5344CB8AC3E}">
-        <p14:creationId xmlns:p14="http://schemas.microsoft.com/office/powerpoint/2010/main" val="3463333536"/>
+        <p14:creationId xmlns:p14="http://schemas.microsoft.com/office/powerpoint/2010/main" val="1158840641"/>
       </p:ext>
     </p:extLst>
   </p:cSld>
@@ -6612,7 +6971,7 @@
           <a:p>
             <a:r>
               <a:rPr lang="fr-FR" dirty="0" smtClean="0"/>
-              <a:t>Tern.java - TODOS</a:t>
+              <a:t>Tern.java – Lint</a:t>
             </a:r>
             <a:endParaRPr lang="fr-FR" dirty="0"/>
           </a:p>
@@ -6633,25 +6992,6 @@
           <a:bodyPr/>
           <a:lstStyle/>
           <a:p>
-            <a:r>
-              <a:rPr lang="fr-FR" dirty="0" err="1" smtClean="0"/>
-              <a:t>Refactoring</a:t>
-            </a:r>
-            <a:endParaRPr lang="fr-FR" dirty="0" smtClean="0"/>
-          </a:p>
-          <a:p>
-            <a:r>
-              <a:rPr lang="fr-FR" dirty="0" err="1" smtClean="0"/>
-              <a:t>Search</a:t>
-            </a:r>
-            <a:r>
-              <a:rPr lang="fr-FR" dirty="0" smtClean="0"/>
-              <a:t> </a:t>
-            </a:r>
-            <a:r>
-              <a:rPr lang="fr-FR" dirty="0" err="1" smtClean="0"/>
-              <a:t>references</a:t>
-            </a:r>
             <a:endParaRPr lang="fr-FR" dirty="0"/>
           </a:p>
         </p:txBody>
@@ -6659,7 +6999,182 @@
     </p:spTree>
     <p:extLst>
       <p:ext uri="{BB962C8B-B14F-4D97-AF65-F5344CB8AC3E}">
-        <p14:creationId xmlns:p14="http://schemas.microsoft.com/office/powerpoint/2010/main" val="4273097244"/>
+        <p14:creationId xmlns:p14="http://schemas.microsoft.com/office/powerpoint/2010/main" val="1158840641"/>
+      </p:ext>
+    </p:extLst>
+  </p:cSld>
+  <p:clrMapOvr>
+    <a:masterClrMapping/>
+  </p:clrMapOvr>
+</p:sld>
+</file>
+
+<file path=ppt/slides/slide29.xml><?xml version="1.0" encoding="utf-8"?>
+<p:sld xmlns:a="http://schemas.openxmlformats.org/drawingml/2006/main" xmlns:r="http://schemas.openxmlformats.org/officeDocument/2006/relationships" xmlns:p="http://schemas.openxmlformats.org/presentationml/2006/main">
+  <p:cSld>
+    <p:spTree>
+      <p:nvGrpSpPr>
+        <p:cNvPr id="1" name=""/>
+        <p:cNvGrpSpPr/>
+        <p:nvPr/>
+      </p:nvGrpSpPr>
+      <p:grpSpPr>
+        <a:xfrm>
+          <a:off x="0" y="0"/>
+          <a:ext cx="0" cy="0"/>
+          <a:chOff x="0" y="0"/>
+          <a:chExt cx="0" cy="0"/>
+        </a:xfrm>
+      </p:grpSpPr>
+      <p:sp>
+        <p:nvSpPr>
+          <p:cNvPr id="2" name="Titre 1"/>
+          <p:cNvSpPr>
+            <a:spLocks noGrp="1"/>
+          </p:cNvSpPr>
+          <p:nvPr>
+            <p:ph type="title"/>
+          </p:nvPr>
+        </p:nvSpPr>
+        <p:spPr/>
+        <p:txBody>
+          <a:bodyPr/>
+          <a:lstStyle/>
+          <a:p>
+            <a:r>
+              <a:rPr lang="fr-FR" dirty="0" err="1" smtClean="0"/>
+              <a:t>AngularJS</a:t>
+            </a:r>
+            <a:r>
+              <a:rPr lang="fr-FR" dirty="0" smtClean="0"/>
+              <a:t> Eclipse</a:t>
+            </a:r>
+            <a:endParaRPr lang="fr-FR" dirty="0"/>
+          </a:p>
+        </p:txBody>
+      </p:sp>
+      <p:sp>
+        <p:nvSpPr>
+          <p:cNvPr id="3" name="Espace réservé du contenu 2"/>
+          <p:cNvSpPr>
+            <a:spLocks noGrp="1"/>
+          </p:cNvSpPr>
+          <p:nvPr>
+            <p:ph sz="quarter" idx="13"/>
+          </p:nvPr>
+        </p:nvSpPr>
+        <p:spPr/>
+        <p:txBody>
+          <a:bodyPr/>
+          <a:lstStyle/>
+          <a:p>
+            <a:r>
+              <a:rPr lang="fr-FR" dirty="0" err="1" smtClean="0"/>
+              <a:t>AngularJS</a:t>
+            </a:r>
+            <a:r>
+              <a:rPr lang="fr-FR" dirty="0" smtClean="0"/>
+              <a:t> Eclipse </a:t>
+            </a:r>
+            <a:r>
+              <a:rPr lang="fr-FR" dirty="0"/>
+              <a:t>est disponible sur </a:t>
+            </a:r>
+            <a:r>
+              <a:rPr lang="fr-FR" dirty="0">
+                <a:hlinkClick r:id="rId2"/>
+              </a:rPr>
+              <a:t>https://</a:t>
+            </a:r>
+            <a:r>
+              <a:rPr lang="fr-FR" dirty="0" smtClean="0">
+                <a:hlinkClick r:id="rId2"/>
+              </a:rPr>
+              <a:t>github.com/angelozerr/angularjs-eclipse</a:t>
+            </a:r>
+            <a:endParaRPr lang="fr-FR" dirty="0" smtClean="0"/>
+          </a:p>
+          <a:p>
+            <a:r>
+              <a:rPr lang="fr-FR" dirty="0" smtClean="0"/>
+              <a:t>Il est basé sur </a:t>
+            </a:r>
+            <a:r>
+              <a:rPr lang="fr-FR" dirty="0" err="1" smtClean="0"/>
+              <a:t>Tern</a:t>
+            </a:r>
+            <a:r>
+              <a:rPr lang="fr-FR" dirty="0" smtClean="0"/>
+              <a:t> IDE</a:t>
+            </a:r>
+          </a:p>
+          <a:p>
+            <a:r>
+              <a:rPr lang="fr-FR" dirty="0" smtClean="0"/>
+              <a:t>Il fournit la </a:t>
+            </a:r>
+            <a:r>
+              <a:rPr lang="fr-FR" dirty="0" err="1" smtClean="0"/>
+              <a:t>completion</a:t>
+            </a:r>
+            <a:r>
+              <a:rPr lang="fr-FR" dirty="0" smtClean="0"/>
+              <a:t>, </a:t>
+            </a:r>
+            <a:r>
+              <a:rPr lang="fr-FR" dirty="0" err="1" smtClean="0"/>
+              <a:t>hyperlink</a:t>
+            </a:r>
+            <a:r>
+              <a:rPr lang="fr-FR" dirty="0" smtClean="0"/>
+              <a:t>, </a:t>
+            </a:r>
+            <a:r>
+              <a:rPr lang="fr-FR" dirty="0" err="1" smtClean="0"/>
+              <a:t>hover</a:t>
+            </a:r>
+            <a:r>
+              <a:rPr lang="fr-FR" dirty="0" smtClean="0"/>
+              <a:t>, validation spécifique à </a:t>
+            </a:r>
+            <a:r>
+              <a:rPr lang="fr-FR" dirty="0" err="1" smtClean="0"/>
+              <a:t>AngularJS</a:t>
+            </a:r>
+            <a:r>
+              <a:rPr lang="fr-FR" dirty="0" smtClean="0"/>
+              <a:t> pour :</a:t>
+            </a:r>
+          </a:p>
+          <a:p>
+            <a:pPr lvl="1"/>
+            <a:r>
+              <a:rPr lang="fr-FR" dirty="0"/>
+              <a:t>l</a:t>
+            </a:r>
+            <a:r>
+              <a:rPr lang="fr-FR" dirty="0" smtClean="0"/>
+              <a:t>’éditeur HTML</a:t>
+            </a:r>
+          </a:p>
+          <a:p>
+            <a:pPr lvl="1"/>
+            <a:r>
+              <a:rPr lang="fr-FR" dirty="0"/>
+              <a:t>l</a:t>
+            </a:r>
+            <a:r>
+              <a:rPr lang="fr-FR" dirty="0" smtClean="0"/>
+              <a:t>’éditeur JavaScript</a:t>
+            </a:r>
+            <a:endParaRPr lang="fr-FR" dirty="0"/>
+          </a:p>
+        </p:txBody>
+      </p:sp>
+    </p:spTree>
+    <p:extLst>
+      <p:ext uri="{BB962C8B-B14F-4D97-AF65-F5344CB8AC3E}">
+        <p14:creationId xmlns:p14="http://schemas.microsoft.com/office/powerpoint/2010/main" val="3463333536"/>
       </p:ext>
     </p:extLst>
   </p:cSld>
@@ -6879,6 +7394,366 @@
       </p:par>
     </p:tnLst>
   </p:timing>
+</p:sld>
+</file>
+
+<file path=ppt/slides/slide30.xml><?xml version="1.0" encoding="utf-8"?>
+<p:sld xmlns:a="http://schemas.openxmlformats.org/drawingml/2006/main" xmlns:r="http://schemas.openxmlformats.org/officeDocument/2006/relationships" xmlns:p="http://schemas.openxmlformats.org/presentationml/2006/main">
+  <p:cSld>
+    <p:spTree>
+      <p:nvGrpSpPr>
+        <p:cNvPr id="1" name=""/>
+        <p:cNvGrpSpPr/>
+        <p:nvPr/>
+      </p:nvGrpSpPr>
+      <p:grpSpPr>
+        <a:xfrm>
+          <a:off x="0" y="0"/>
+          <a:ext cx="0" cy="0"/>
+          <a:chOff x="0" y="0"/>
+          <a:chExt cx="0" cy="0"/>
+        </a:xfrm>
+      </p:grpSpPr>
+      <p:sp>
+        <p:nvSpPr>
+          <p:cNvPr id="2" name="Titre 1"/>
+          <p:cNvSpPr>
+            <a:spLocks noGrp="1"/>
+          </p:cNvSpPr>
+          <p:nvPr>
+            <p:ph type="title"/>
+          </p:nvPr>
+        </p:nvSpPr>
+        <p:spPr/>
+        <p:txBody>
+          <a:bodyPr/>
+          <a:lstStyle/>
+          <a:p>
+            <a:r>
+              <a:rPr lang="fr-FR" dirty="0" smtClean="0"/>
+              <a:t>Tern.java - TODOS</a:t>
+            </a:r>
+            <a:endParaRPr lang="fr-FR" dirty="0"/>
+          </a:p>
+        </p:txBody>
+      </p:sp>
+      <p:sp>
+        <p:nvSpPr>
+          <p:cNvPr id="3" name="Espace réservé du contenu 2"/>
+          <p:cNvSpPr>
+            <a:spLocks noGrp="1"/>
+          </p:cNvSpPr>
+          <p:nvPr>
+            <p:ph sz="quarter" idx="13"/>
+          </p:nvPr>
+        </p:nvSpPr>
+        <p:spPr/>
+        <p:txBody>
+          <a:bodyPr/>
+          <a:lstStyle/>
+          <a:p>
+            <a:r>
+              <a:rPr lang="fr-FR" dirty="0" err="1" smtClean="0"/>
+              <a:t>Refactoring</a:t>
+            </a:r>
+            <a:endParaRPr lang="fr-FR" dirty="0" smtClean="0"/>
+          </a:p>
+          <a:p>
+            <a:r>
+              <a:rPr lang="fr-FR" dirty="0" err="1" smtClean="0"/>
+              <a:t>Search</a:t>
+            </a:r>
+            <a:r>
+              <a:rPr lang="fr-FR" dirty="0" smtClean="0"/>
+              <a:t> </a:t>
+            </a:r>
+            <a:r>
+              <a:rPr lang="fr-FR" dirty="0" err="1" smtClean="0"/>
+              <a:t>references</a:t>
+            </a:r>
+            <a:endParaRPr lang="fr-FR" dirty="0"/>
+          </a:p>
+        </p:txBody>
+      </p:sp>
+    </p:spTree>
+    <p:extLst>
+      <p:ext uri="{BB962C8B-B14F-4D97-AF65-F5344CB8AC3E}">
+        <p14:creationId xmlns:p14="http://schemas.microsoft.com/office/powerpoint/2010/main" val="4273097244"/>
+      </p:ext>
+    </p:extLst>
+  </p:cSld>
+  <p:clrMapOvr>
+    <a:masterClrMapping/>
+  </p:clrMapOvr>
+</p:sld>
+</file>
+
+<file path=ppt/slides/slide31.xml><?xml version="1.0" encoding="utf-8"?>
+<p:sld xmlns:a="http://schemas.openxmlformats.org/drawingml/2006/main" xmlns:r="http://schemas.openxmlformats.org/officeDocument/2006/relationships" xmlns:p="http://schemas.openxmlformats.org/presentationml/2006/main">
+  <p:cSld>
+    <p:spTree>
+      <p:nvGrpSpPr>
+        <p:cNvPr id="1" name=""/>
+        <p:cNvGrpSpPr/>
+        <p:nvPr/>
+      </p:nvGrpSpPr>
+      <p:grpSpPr>
+        <a:xfrm>
+          <a:off x="0" y="0"/>
+          <a:ext cx="0" cy="0"/>
+          <a:chOff x="0" y="0"/>
+          <a:chExt cx="0" cy="0"/>
+        </a:xfrm>
+      </p:grpSpPr>
+      <p:sp>
+        <p:nvSpPr>
+          <p:cNvPr id="2" name="Titre 1"/>
+          <p:cNvSpPr>
+            <a:spLocks noGrp="1"/>
+          </p:cNvSpPr>
+          <p:nvPr>
+            <p:ph type="title"/>
+          </p:nvPr>
+        </p:nvSpPr>
+        <p:spPr/>
+        <p:txBody>
+          <a:bodyPr/>
+          <a:lstStyle/>
+          <a:p>
+            <a:r>
+              <a:rPr lang="fr-FR" dirty="0" err="1" smtClean="0"/>
+              <a:t>AngularJS</a:t>
+            </a:r>
+            <a:r>
+              <a:rPr lang="fr-FR" dirty="0" smtClean="0"/>
+              <a:t> Eclipse - Installation</a:t>
+            </a:r>
+            <a:endParaRPr lang="fr-FR" dirty="0"/>
+          </a:p>
+        </p:txBody>
+      </p:sp>
+      <p:sp>
+        <p:nvSpPr>
+          <p:cNvPr id="3" name="Espace réservé du contenu 2"/>
+          <p:cNvSpPr>
+            <a:spLocks noGrp="1"/>
+          </p:cNvSpPr>
+          <p:nvPr>
+            <p:ph sz="quarter" idx="13"/>
+          </p:nvPr>
+        </p:nvSpPr>
+        <p:spPr/>
+        <p:txBody>
+          <a:bodyPr>
+            <a:normAutofit fontScale="92500" lnSpcReduction="20000"/>
+          </a:bodyPr>
+          <a:lstStyle/>
+          <a:p>
+            <a:r>
+              <a:rPr lang="fr-FR" dirty="0" smtClean="0"/>
+              <a:t>Marketplace </a:t>
+            </a:r>
+            <a:r>
+              <a:rPr lang="fr-FR" dirty="0"/>
+              <a:t>: </a:t>
+            </a:r>
+            <a:r>
+              <a:rPr lang="fr-FR" dirty="0">
+                <a:hlinkClick r:id="rId2"/>
+              </a:rPr>
+              <a:t>http://</a:t>
+            </a:r>
+            <a:r>
+              <a:rPr lang="fr-FR" dirty="0" smtClean="0">
+                <a:hlinkClick r:id="rId2"/>
+              </a:rPr>
+              <a:t>marketplace.eclipse.org/content/angularjs-eclipse</a:t>
+            </a:r>
+            <a:endParaRPr lang="fr-FR" dirty="0" smtClean="0"/>
+          </a:p>
+          <a:p>
+            <a:r>
+              <a:rPr lang="fr-FR" dirty="0" smtClean="0"/>
+              <a:t>Ou Update </a:t>
+            </a:r>
+            <a:r>
+              <a:rPr lang="fr-FR" dirty="0"/>
+              <a:t>site </a:t>
+            </a:r>
+            <a:r>
+              <a:rPr lang="fr-FR" dirty="0" smtClean="0"/>
+              <a:t>: </a:t>
+            </a:r>
+            <a:r>
+              <a:rPr lang="fr-FR" dirty="0">
+                <a:hlinkClick r:id="rId3"/>
+              </a:rPr>
+              <a:t>http://</a:t>
+            </a:r>
+            <a:r>
+              <a:rPr lang="fr-FR" dirty="0" smtClean="0">
+                <a:hlinkClick r:id="rId3"/>
+              </a:rPr>
+              <a:t>oss.opensagres.fr/angularjs-eclipse/0.4.0/</a:t>
+            </a:r>
+            <a:endParaRPr lang="fr-FR" dirty="0" smtClean="0"/>
+          </a:p>
+          <a:p>
+            <a:endParaRPr lang="fr-FR" dirty="0"/>
+          </a:p>
+          <a:p>
+            <a:endParaRPr lang="fr-FR" dirty="0" smtClean="0"/>
+          </a:p>
+          <a:p>
+            <a:endParaRPr lang="fr-FR" dirty="0"/>
+          </a:p>
+          <a:p>
+            <a:endParaRPr lang="fr-FR" dirty="0" smtClean="0"/>
+          </a:p>
+          <a:p>
+            <a:endParaRPr lang="fr-FR" dirty="0"/>
+          </a:p>
+          <a:p>
+            <a:endParaRPr lang="fr-FR" dirty="0" smtClean="0"/>
+          </a:p>
+          <a:p>
+            <a:endParaRPr lang="fr-FR" dirty="0"/>
+          </a:p>
+          <a:p>
+            <a:endParaRPr lang="fr-FR" dirty="0" smtClean="0"/>
+          </a:p>
+          <a:p>
+            <a:endParaRPr lang="fr-FR" dirty="0"/>
+          </a:p>
+          <a:p>
+            <a:pPr marL="0" indent="0">
+              <a:buNone/>
+            </a:pPr>
+            <a:r>
+              <a:rPr lang="fr-FR" dirty="0" smtClean="0">
+                <a:solidFill>
+                  <a:srgbClr val="FFC000"/>
+                </a:solidFill>
+              </a:rPr>
+              <a:t>►</a:t>
+            </a:r>
+            <a:r>
+              <a:rPr lang="fr-FR" dirty="0" smtClean="0"/>
+              <a:t>pour démarrer avec </a:t>
+            </a:r>
+            <a:r>
+              <a:rPr lang="fr-FR" dirty="0" err="1" smtClean="0"/>
+              <a:t>AngularJS</a:t>
+            </a:r>
+            <a:r>
+              <a:rPr lang="fr-FR" dirty="0" smtClean="0"/>
+              <a:t> Eclipse </a:t>
+            </a:r>
+            <a:r>
+              <a:rPr lang="fr-FR" dirty="0"/>
+              <a:t>: </a:t>
+            </a:r>
+            <a:r>
+              <a:rPr lang="fr-FR" dirty="0">
+                <a:hlinkClick r:id="rId4"/>
+              </a:rPr>
+              <a:t>https://</a:t>
+            </a:r>
+            <a:r>
+              <a:rPr lang="fr-FR" dirty="0" smtClean="0">
+                <a:hlinkClick r:id="rId4"/>
+              </a:rPr>
+              <a:t>github.com/angelozerr/angularjs-eclipse/wiki/Getting-Started</a:t>
+            </a:r>
+            <a:endParaRPr lang="fr-FR" dirty="0" smtClean="0"/>
+          </a:p>
+          <a:p>
+            <a:pPr marL="0" indent="0">
+              <a:buNone/>
+            </a:pPr>
+            <a:endParaRPr lang="fr-FR" dirty="0"/>
+          </a:p>
+          <a:p>
+            <a:pPr marL="0" indent="0">
+              <a:buNone/>
+            </a:pPr>
+            <a:endParaRPr lang="fr-FR" dirty="0"/>
+          </a:p>
+          <a:p>
+            <a:endParaRPr lang="fr-FR" dirty="0" smtClean="0"/>
+          </a:p>
+          <a:p>
+            <a:endParaRPr lang="fr-FR" dirty="0" smtClean="0"/>
+          </a:p>
+          <a:p>
+            <a:endParaRPr lang="fr-FR" dirty="0" smtClean="0"/>
+          </a:p>
+        </p:txBody>
+      </p:sp>
+      <p:pic>
+        <p:nvPicPr>
+          <p:cNvPr id="9218" name="Picture 2"/>
+          <p:cNvPicPr>
+            <a:picLocks noChangeAspect="1" noChangeArrowheads="1"/>
+          </p:cNvPicPr>
+          <p:nvPr/>
+        </p:nvPicPr>
+        <p:blipFill>
+          <a:blip r:embed="rId5">
+            <a:extLst>
+              <a:ext uri="{28A0092B-C50C-407E-A947-70E740481C1C}">
+                <a14:useLocalDpi xmlns:a14="http://schemas.microsoft.com/office/drawing/2010/main" val="0"/>
+              </a:ext>
+            </a:extLst>
+          </a:blip>
+          <a:srcRect/>
+          <a:stretch>
+            <a:fillRect/>
+          </a:stretch>
+        </p:blipFill>
+        <p:spPr bwMode="auto">
+          <a:xfrm>
+            <a:off x="1691680" y="2276872"/>
+            <a:ext cx="4810125" cy="2600325"/>
+          </a:xfrm>
+          <a:prstGeom prst="rect">
+            <a:avLst/>
+          </a:prstGeom>
+          <a:noFill/>
+          <a:ln>
+            <a:noFill/>
+          </a:ln>
+          <a:extLst>
+            <a:ext uri="{909E8E84-426E-40DD-AFC4-6F175D3DCCD1}">
+              <a14:hiddenFill xmlns:a14="http://schemas.microsoft.com/office/drawing/2010/main">
+                <a:solidFill>
+                  <a:schemeClr val="accent1"/>
+                </a:solidFill>
+              </a14:hiddenFill>
+            </a:ext>
+            <a:ext uri="{91240B29-F687-4F45-9708-019B960494DF}">
+              <a14:hiddenLine xmlns:a14="http://schemas.microsoft.com/office/drawing/2010/main" w="9525">
+                <a:solidFill>
+                  <a:schemeClr val="tx1"/>
+                </a:solidFill>
+                <a:miter lim="800000"/>
+                <a:headEnd/>
+                <a:tailEnd/>
+              </a14:hiddenLine>
+            </a:ext>
+          </a:extLst>
+        </p:spPr>
+      </p:pic>
+    </p:spTree>
+    <p:extLst>
+      <p:ext uri="{BB962C8B-B14F-4D97-AF65-F5344CB8AC3E}">
+        <p14:creationId xmlns:p14="http://schemas.microsoft.com/office/powerpoint/2010/main" val="1436139672"/>
+      </p:ext>
+    </p:extLst>
+  </p:cSld>
+  <p:clrMapOvr>
+    <a:masterClrMapping/>
+  </p:clrMapOvr>
 </p:sld>
 </file>
 
@@ -7777,7 +8652,11 @@
             <a:pPr lvl="1"/>
             <a:r>
               <a:rPr lang="fr-FR" dirty="0"/>
-              <a:t>ACE : </a:t>
+              <a:t>ACE </a:t>
+            </a:r>
+            <a:r>
+              <a:rPr lang="fr-FR" dirty="0" smtClean="0"/>
+              <a:t>(POC): </a:t>
             </a:r>
             <a:r>
               <a:rPr lang="fr-FR" dirty="0">
@@ -7791,7 +8670,11 @@
             <a:pPr lvl="1"/>
             <a:r>
               <a:rPr lang="fr-FR" dirty="0"/>
-              <a:t>Orion : </a:t>
+              <a:t>Orion (POC)</a:t>
+            </a:r>
+            <a:r>
+              <a:rPr lang="fr-FR" dirty="0" smtClean="0"/>
+              <a:t>: </a:t>
             </a:r>
             <a:r>
               <a:rPr lang="fr-FR" dirty="0">
@@ -8007,13 +8890,8 @@
             <a:pPr lvl="2"/>
             <a:r>
               <a:rPr lang="fr-FR" dirty="0" smtClean="0"/>
-              <a:t>écrit en </a:t>
-            </a:r>
-            <a:r>
-              <a:rPr lang="fr-FR" dirty="0" err="1" smtClean="0"/>
-              <a:t>JavaSCript</a:t>
-            </a:r>
-            <a:endParaRPr lang="fr-FR" dirty="0" smtClean="0"/>
+              <a:t>écrit en JavaScript</a:t>
+            </a:r>
           </a:p>
           <a:p>
             <a:pPr lvl="2"/>

</xml_diff>

<commit_message>
Explain node.js tern server.
</commit_message>
<xml_diff>
--- a/docs/tern.java_fr.pptx
+++ b/docs/tern.java_fr.pptx
@@ -25,17 +25,17 @@
     <p:sldId id="283" r:id="rId19"/>
     <p:sldId id="273" r:id="rId20"/>
     <p:sldId id="285" r:id="rId21"/>
-    <p:sldId id="286" r:id="rId22"/>
-    <p:sldId id="284" r:id="rId23"/>
-    <p:sldId id="272" r:id="rId24"/>
-    <p:sldId id="269" r:id="rId25"/>
-    <p:sldId id="263" r:id="rId26"/>
-    <p:sldId id="265" r:id="rId27"/>
-    <p:sldId id="266" r:id="rId28"/>
-    <p:sldId id="267" r:id="rId29"/>
+    <p:sldId id="291" r:id="rId22"/>
+    <p:sldId id="290" r:id="rId23"/>
+    <p:sldId id="292" r:id="rId24"/>
+    <p:sldId id="293" r:id="rId25"/>
+    <p:sldId id="294" r:id="rId26"/>
+    <p:sldId id="284" r:id="rId27"/>
+    <p:sldId id="295" r:id="rId28"/>
+    <p:sldId id="296" r:id="rId29"/>
     <p:sldId id="264" r:id="rId30"/>
-    <p:sldId id="268" r:id="rId31"/>
-    <p:sldId id="288" r:id="rId32"/>
+    <p:sldId id="288" r:id="rId31"/>
+    <p:sldId id="268" r:id="rId32"/>
   </p:sldIdLst>
   <p:sldSz cx="9144000" cy="6858000" type="screen4x3"/>
   <p:notesSz cx="6858000" cy="9144000"/>
@@ -3548,7 +3548,6 @@
           </a:bodyPr>
           <a:lstStyle/>
           <a:p>
-            <a:pPr algn="l"/>
             <a:r>
               <a:rPr lang="fr-FR" dirty="0" smtClean="0"/>
               <a:t>Utilisation du moteur d’inférence tern.js dans un contexte Java</a:t>
@@ -4080,8 +4079,13 @@
             </a:r>
             <a:r>
               <a:rPr lang="fr-FR" dirty="0"/>
-              <a:t> est le plugin Eclipse pour JavaScript officiel.</a:t>
-            </a:r>
+              <a:t> est le plugin Eclipse officiel </a:t>
+            </a:r>
+            <a:r>
+              <a:rPr lang="fr-FR" dirty="0" smtClean="0"/>
+              <a:t>pour JavaScript.</a:t>
+            </a:r>
+            <a:endParaRPr lang="fr-FR" dirty="0"/>
           </a:p>
           <a:p>
             <a:r>
@@ -4146,22 +4150,79 @@
             </a:r>
             <a:r>
               <a:rPr lang="fr-FR" dirty="0" smtClean="0"/>
+              <a:t> Node.js : fournit un serveur node.js (à utiliser si node.js n’est pas installé)</a:t>
+            </a:r>
+            <a:endParaRPr lang="fr-FR" dirty="0"/>
+          </a:p>
+          <a:p>
+            <a:pPr lvl="1"/>
+            <a:r>
+              <a:rPr lang="fr-FR" dirty="0" err="1" smtClean="0"/>
+              <a:t>Tern</a:t>
+            </a:r>
+            <a:r>
+              <a:rPr lang="fr-FR" dirty="0" smtClean="0"/>
+              <a:t> – JSDT : étend </a:t>
+            </a:r>
+            <a:r>
+              <a:rPr lang="fr-FR" dirty="0"/>
+              <a:t>la </a:t>
+            </a:r>
+            <a:r>
+              <a:rPr lang="fr-FR" dirty="0" smtClean="0"/>
+              <a:t>complétion</a:t>
+            </a:r>
+            <a:r>
+              <a:rPr lang="fr-FR" dirty="0"/>
+              <a:t>, </a:t>
+            </a:r>
+            <a:r>
+              <a:rPr lang="fr-FR" dirty="0" err="1"/>
+              <a:t>text</a:t>
+            </a:r>
+            <a:r>
+              <a:rPr lang="fr-FR" dirty="0"/>
               <a:t> </a:t>
             </a:r>
             <a:r>
+              <a:rPr lang="fr-FR" dirty="0" err="1"/>
+              <a:t>hover</a:t>
+            </a:r>
+            <a:r>
               <a:rPr lang="fr-FR" dirty="0"/>
-              <a:t>Node.js</a:t>
-            </a:r>
-          </a:p>
-          <a:p>
-            <a:pPr lvl="1"/>
-            <a:r>
-              <a:rPr lang="fr-FR" dirty="0" err="1" smtClean="0"/>
-              <a:t>Tern</a:t>
-            </a:r>
-            <a:r>
-              <a:rPr lang="fr-FR" dirty="0" smtClean="0"/>
-              <a:t> – JSDT</a:t>
+              <a:t> pour </a:t>
+            </a:r>
+            <a:r>
+              <a:rPr lang="fr-FR" dirty="0" smtClean="0"/>
+              <a:t>utiliser </a:t>
+            </a:r>
+            <a:r>
+              <a:rPr lang="fr-FR" dirty="0" err="1"/>
+              <a:t>tern</a:t>
+            </a:r>
+            <a:r>
+              <a:rPr lang="fr-FR" dirty="0"/>
+              <a:t> dans l’</a:t>
+            </a:r>
+            <a:r>
+              <a:rPr lang="fr-FR" dirty="0" err="1"/>
+              <a:t>editeur</a:t>
+            </a:r>
+            <a:r>
+              <a:rPr lang="fr-FR" dirty="0"/>
+              <a:t> </a:t>
+            </a:r>
+            <a:r>
+              <a:rPr lang="fr-FR" dirty="0" err="1"/>
+              <a:t>Javascript</a:t>
+            </a:r>
+            <a:r>
+              <a:rPr lang="fr-FR" dirty="0"/>
+              <a:t> </a:t>
+            </a:r>
+            <a:r>
+              <a:rPr lang="fr-FR" dirty="0" smtClean="0"/>
+              <a:t>JSDT</a:t>
             </a:r>
           </a:p>
           <a:p>
@@ -4629,10 +4690,10 @@
             </a:r>
             <a:r>
               <a:rPr lang="fr-FR" dirty="0" smtClean="0"/>
-              <a:t> sait que </a:t>
-            </a:r>
-            <a:r>
-              <a:rPr lang="fr-FR" dirty="0" err="1" smtClean="0"/>
+              <a:t> sait que la variable </a:t>
+            </a:r>
+            <a:r>
+              <a:rPr lang="fr-FR" b="1" i="1" dirty="0" err="1" smtClean="0"/>
               <a:t>elt</a:t>
             </a:r>
             <a:r>
@@ -4640,7 +4701,7 @@
               <a:t> est de type </a:t>
             </a:r>
             <a:r>
-              <a:rPr lang="fr-FR" b="1" dirty="0" err="1" smtClean="0"/>
+              <a:rPr lang="fr-FR" b="1" i="1" dirty="0" err="1" smtClean="0"/>
               <a:t>HTMLElement</a:t>
             </a:r>
             <a:r>
@@ -4805,7 +4866,23 @@
             </a:r>
             <a:r>
               <a:rPr lang="fr-FR" dirty="0" smtClean="0"/>
-              <a:t> sait que e est un événement d’une callback :</a:t>
+              <a:t> sait que </a:t>
+            </a:r>
+            <a:r>
+              <a:rPr lang="fr-FR" b="1" i="1" dirty="0" smtClean="0"/>
+              <a:t>e</a:t>
+            </a:r>
+            <a:r>
+              <a:rPr lang="fr-FR" dirty="0" smtClean="0"/>
+              <a:t> est un </a:t>
+            </a:r>
+            <a:r>
+              <a:rPr lang="fr-FR" b="1" i="1" dirty="0" smtClean="0"/>
+              <a:t>événement</a:t>
+            </a:r>
+            <a:r>
+              <a:rPr lang="fr-FR" dirty="0" smtClean="0"/>
+              <a:t> d’une callback :</a:t>
             </a:r>
           </a:p>
           <a:p>
@@ -5295,15 +5372,7 @@
             </a:r>
             <a:r>
               <a:rPr lang="fr-FR" dirty="0" smtClean="0"/>
-              <a:t> </a:t>
-            </a:r>
-            <a:r>
-              <a:rPr lang="fr-FR" dirty="0" err="1" smtClean="0"/>
-              <a:t>attent</a:t>
-            </a:r>
-            <a:r>
-              <a:rPr lang="fr-FR" dirty="0" smtClean="0"/>
-              <a:t> une string :</a:t>
+              <a:t> attend une string :</a:t>
             </a:r>
           </a:p>
           <a:p>
@@ -5503,7 +5572,7 @@
             </a:r>
             <a:r>
               <a:rPr lang="fr-FR" dirty="0" err="1" smtClean="0"/>
-              <a:t>jQuery</a:t>
+              <a:t>jquery</a:t>
             </a:r>
             <a:r>
               <a:rPr lang="fr-FR" dirty="0" smtClean="0"/>
@@ -5515,7 +5584,7 @@
       </p:sp>
       <p:pic>
         <p:nvPicPr>
-          <p:cNvPr id="6146" name="Picture 2"/>
+          <p:cNvPr id="6147" name="Picture 3"/>
           <p:cNvPicPr>
             <a:picLocks noChangeAspect="1" noChangeArrowheads="1"/>
           </p:cNvPicPr>
@@ -5536,8 +5605,8 @@
         </p:blipFill>
         <p:spPr bwMode="auto">
           <a:xfrm>
-            <a:off x="5292080" y="1124744"/>
-            <a:ext cx="3528392" cy="4210150"/>
+            <a:off x="2123728" y="1916832"/>
+            <a:ext cx="3321436" cy="3422700"/>
           </a:xfrm>
           <a:prstGeom prst="rect">
             <a:avLst/>
@@ -5890,7 +5959,11 @@
           <a:p>
             <a:r>
               <a:rPr lang="fr-FR" dirty="0" smtClean="0"/>
-              <a:t>TERN IDE &amp; Modules</a:t>
+              <a:t>TERN IDE &amp; </a:t>
+            </a:r>
+            <a:r>
+              <a:rPr lang="fr-FR" dirty="0" err="1" smtClean="0"/>
+              <a:t>jQuery</a:t>
             </a:r>
             <a:endParaRPr lang="fr-FR" dirty="0"/>
           </a:p>
@@ -5909,7 +5982,7 @@
         <p:spPr/>
         <p:txBody>
           <a:bodyPr>
-            <a:normAutofit/>
+            <a:normAutofit fontScale="92500"/>
           </a:bodyPr>
           <a:lstStyle/>
           <a:p>
@@ -5973,21 +6046,37 @@
           </a:p>
           <a:p>
             <a:pPr marL="342900" lvl="1" indent="-342900"/>
-            <a:endParaRPr lang="fr-FR" dirty="0"/>
+            <a:endParaRPr lang="fr-FR" dirty="0" smtClean="0"/>
           </a:p>
           <a:p>
             <a:pPr marL="342900" lvl="1" indent="-342900"/>
-            <a:endParaRPr lang="fr-FR" dirty="0" smtClean="0"/>
-          </a:p>
-          <a:p>
-            <a:pPr marL="342900" lvl="1" indent="-342900"/>
+            <a:r>
+              <a:rPr lang="fr-FR" dirty="0" smtClean="0">
+                <a:solidFill>
+                  <a:srgbClr val="FFC000"/>
+                </a:solidFill>
+              </a:rPr>
+              <a:t>►</a:t>
+            </a:r>
+            <a:r>
+              <a:rPr lang="fr-FR" dirty="0" err="1" smtClean="0"/>
+              <a:t>jquery</a:t>
+            </a:r>
+            <a:r>
+              <a:rPr lang="fr-FR" dirty="0" smtClean="0"/>
+              <a:t> est un JSON Type </a:t>
+            </a:r>
+            <a:r>
+              <a:rPr lang="fr-FR" dirty="0" err="1" smtClean="0"/>
+              <a:t>Definition</a:t>
+            </a:r>
             <a:endParaRPr lang="fr-FR" dirty="0"/>
           </a:p>
         </p:txBody>
       </p:sp>
       <p:pic>
         <p:nvPicPr>
-          <p:cNvPr id="7170" name="Picture 2"/>
+          <p:cNvPr id="6" name="Picture 2"/>
           <p:cNvPicPr>
             <a:picLocks noChangeAspect="1" noChangeArrowheads="1"/>
           </p:cNvPicPr>
@@ -6008,7 +6097,7 @@
         </p:blipFill>
         <p:spPr bwMode="auto">
           <a:xfrm>
-            <a:off x="611560" y="2187573"/>
+            <a:off x="611560" y="2060848"/>
             <a:ext cx="7780101" cy="3113633"/>
           </a:xfrm>
           <a:prstGeom prst="rect">
@@ -6086,7 +6175,7 @@
           <a:p>
             <a:r>
               <a:rPr lang="fr-FR" dirty="0" smtClean="0"/>
-              <a:t>TERN.java – Comment ca marche?</a:t>
+              <a:t>TERN IDE &amp; Node.js module</a:t>
             </a:r>
             <a:endParaRPr lang="fr-FR" dirty="0"/>
           </a:p>
@@ -6105,74 +6194,38 @@
         <p:spPr/>
         <p:txBody>
           <a:bodyPr>
-            <a:normAutofit/>
+            <a:normAutofit lnSpcReduction="10000"/>
           </a:bodyPr>
           <a:lstStyle/>
           <a:p>
             <a:pPr marL="342900" lvl="1" indent="-342900"/>
             <a:r>
               <a:rPr lang="fr-FR" dirty="0" smtClean="0"/>
-              <a:t>TODO : faire </a:t>
-            </a:r>
-            <a:r>
-              <a:rPr lang="fr-FR" dirty="0" err="1" smtClean="0"/>
-              <a:t>schema</a:t>
-            </a:r>
-            <a:r>
-              <a:rPr lang="fr-FR" dirty="0" smtClean="0"/>
-              <a:t> avec </a:t>
-            </a:r>
-            <a:r>
-              <a:rPr lang="fr-FR" dirty="0" err="1" smtClean="0"/>
-              <a:t>Completion</a:t>
-            </a:r>
-            <a:r>
-              <a:rPr lang="fr-FR" dirty="0" smtClean="0"/>
-              <a:t> &lt;-&gt; </a:t>
-            </a:r>
-            <a:r>
-              <a:rPr lang="fr-FR" dirty="0" err="1" smtClean="0"/>
-              <a:t>Tern</a:t>
-            </a:r>
-            <a:r>
-              <a:rPr lang="fr-FR" dirty="0" smtClean="0"/>
-              <a:t> Server</a:t>
+              <a:t>Après avoir </a:t>
+            </a:r>
+            <a:r>
+              <a:rPr lang="fr-FR" dirty="0"/>
+              <a:t>sélectionné le module </a:t>
+            </a:r>
+            <a:r>
+              <a:rPr lang="fr-FR" dirty="0" err="1" smtClean="0"/>
+              <a:t>node</a:t>
+            </a:r>
+            <a:r>
+              <a:rPr lang="fr-FR" dirty="0" smtClean="0"/>
+              <a:t>, on bénéficie de la complétion sur ce </a:t>
+            </a:r>
+            <a:r>
+              <a:rPr lang="fr-FR" dirty="0" err="1" smtClean="0"/>
+              <a:t>framework</a:t>
+            </a:r>
+            <a:r>
+              <a:rPr lang="fr-FR" dirty="0" smtClean="0"/>
+              <a:t>: :</a:t>
             </a:r>
           </a:p>
           <a:p>
             <a:pPr marL="342900" lvl="1" indent="-342900"/>
-            <a:r>
-              <a:rPr lang="fr-FR" dirty="0"/>
-              <a:t>TODO : faire </a:t>
-            </a:r>
-            <a:r>
-              <a:rPr lang="fr-FR" dirty="0" err="1"/>
-              <a:t>schema</a:t>
-            </a:r>
-            <a:r>
-              <a:rPr lang="fr-FR" dirty="0"/>
-              <a:t> avec </a:t>
-            </a:r>
-            <a:r>
-              <a:rPr lang="fr-FR" dirty="0" err="1"/>
-              <a:t>Completion</a:t>
-            </a:r>
-            <a:r>
-              <a:rPr lang="fr-FR" dirty="0"/>
-              <a:t> &lt;-&gt; </a:t>
-            </a:r>
-            <a:r>
-              <a:rPr lang="fr-FR" dirty="0" err="1"/>
-              <a:t>Tern</a:t>
-            </a:r>
-            <a:r>
-              <a:rPr lang="fr-FR" dirty="0"/>
-              <a:t> </a:t>
-            </a:r>
-            <a:r>
-              <a:rPr lang="fr-FR" dirty="0" smtClean="0"/>
-              <a:t>Server qui tourne avec Node.js</a:t>
-            </a:r>
             <a:endParaRPr lang="fr-FR" dirty="0"/>
           </a:p>
           <a:p>
@@ -6181,7 +6234,7 @@
           </a:p>
           <a:p>
             <a:pPr marL="342900" lvl="1" indent="-342900"/>
-            <a:endParaRPr lang="fr-FR" dirty="0" smtClean="0"/>
+            <a:endParaRPr lang="fr-FR" dirty="0"/>
           </a:p>
           <a:p>
             <a:pPr marL="342900" lvl="1" indent="-342900"/>
@@ -6209,6 +6262,42 @@
           </a:p>
           <a:p>
             <a:pPr marL="342900" lvl="1" indent="-342900"/>
+            <a:r>
+              <a:rPr lang="fr-FR" dirty="0" smtClean="0">
+                <a:solidFill>
+                  <a:srgbClr val="FFC000"/>
+                </a:solidFill>
+              </a:rPr>
+              <a:t>►</a:t>
+            </a:r>
+            <a:r>
+              <a:rPr lang="fr-FR" dirty="0" err="1" smtClean="0"/>
+              <a:t>node</a:t>
+            </a:r>
+            <a:r>
+              <a:rPr lang="fr-FR" dirty="0" smtClean="0"/>
+              <a:t> est un plugin </a:t>
+            </a:r>
+            <a:r>
+              <a:rPr lang="fr-FR" dirty="0" err="1" smtClean="0"/>
+              <a:t>tern</a:t>
+            </a:r>
+            <a:r>
+              <a:rPr lang="fr-FR" dirty="0" smtClean="0"/>
+              <a:t>. Ici il gère la fonction </a:t>
+            </a:r>
+            <a:r>
+              <a:rPr lang="fr-FR" dirty="0" err="1" smtClean="0"/>
+              <a:t>require</a:t>
+            </a:r>
+            <a:r>
+              <a:rPr lang="fr-FR" dirty="0" smtClean="0"/>
+              <a:t>.</a:t>
+            </a:r>
+            <a:endParaRPr lang="fr-FR" dirty="0" smtClean="0"/>
+          </a:p>
+          <a:p>
+            <a:pPr marL="342900" lvl="1" indent="-342900"/>
             <a:endParaRPr lang="fr-FR" dirty="0" smtClean="0"/>
           </a:p>
           <a:p>
@@ -6223,12 +6312,90 @@
             <a:pPr marL="342900" lvl="1" indent="-342900"/>
             <a:endParaRPr lang="fr-FR" dirty="0"/>
           </a:p>
-        </p:txBody>
-      </p:sp>
+          <a:p>
+            <a:pPr marL="342900" lvl="1" indent="-342900"/>
+            <a:endParaRPr lang="fr-FR" dirty="0" smtClean="0"/>
+          </a:p>
+          <a:p>
+            <a:pPr marL="342900" lvl="1" indent="-342900"/>
+            <a:endParaRPr lang="fr-FR" dirty="0"/>
+          </a:p>
+          <a:p>
+            <a:pPr marL="342900" lvl="1" indent="-342900"/>
+            <a:endParaRPr lang="fr-FR" dirty="0" smtClean="0"/>
+          </a:p>
+          <a:p>
+            <a:pPr marL="342900" lvl="1" indent="-342900"/>
+            <a:endParaRPr lang="fr-FR" dirty="0"/>
+          </a:p>
+          <a:p>
+            <a:pPr marL="342900" lvl="1" indent="-342900"/>
+            <a:endParaRPr lang="fr-FR" dirty="0" smtClean="0"/>
+          </a:p>
+          <a:p>
+            <a:pPr marL="342900" lvl="1" indent="-342900"/>
+            <a:endParaRPr lang="fr-FR" dirty="0"/>
+          </a:p>
+        </p:txBody>
+      </p:sp>
+      <p:pic>
+        <p:nvPicPr>
+          <p:cNvPr id="15362" name="Picture 2"/>
+          <p:cNvPicPr>
+            <a:picLocks noChangeAspect="1" noChangeArrowheads="1"/>
+          </p:cNvPicPr>
+          <p:nvPr/>
+        </p:nvPicPr>
+        <p:blipFill>
+          <a:blip r:embed="rId2">
+            <a:extLst>
+              <a:ext uri="{28A0092B-C50C-407E-A947-70E740481C1C}">
+                <a14:useLocalDpi xmlns:a14="http://schemas.microsoft.com/office/drawing/2010/main" val="0"/>
+              </a:ext>
+            </a:extLst>
+          </a:blip>
+          <a:srcRect/>
+          <a:stretch>
+            <a:fillRect/>
+          </a:stretch>
+        </p:blipFill>
+        <p:spPr bwMode="auto">
+          <a:xfrm>
+            <a:off x="755576" y="1988840"/>
+            <a:ext cx="7704856" cy="3194894"/>
+          </a:xfrm>
+          <a:prstGeom prst="rect">
+            <a:avLst/>
+          </a:prstGeom>
+          <a:noFill/>
+          <a:ln>
+            <a:noFill/>
+          </a:ln>
+          <a:extLst>
+            <a:ext uri="{909E8E84-426E-40DD-AFC4-6F175D3DCCD1}">
+              <a14:hiddenFill xmlns:a14="http://schemas.microsoft.com/office/drawing/2010/main">
+                <a:solidFill>
+                  <a:schemeClr val="accent1"/>
+                </a:solidFill>
+              </a14:hiddenFill>
+            </a:ext>
+            <a:ext uri="{91240B29-F687-4F45-9708-019B960494DF}">
+              <a14:hiddenLine xmlns:a14="http://schemas.microsoft.com/office/drawing/2010/main" w="9525">
+                <a:solidFill>
+                  <a:schemeClr val="tx1"/>
+                </a:solidFill>
+                <a:miter lim="800000"/>
+                <a:headEnd/>
+                <a:tailEnd/>
+              </a14:hiddenLine>
+            </a:ext>
+          </a:extLst>
+        </p:spPr>
+      </p:pic>
     </p:spTree>
     <p:extLst>
       <p:ext uri="{BB962C8B-B14F-4D97-AF65-F5344CB8AC3E}">
-        <p14:creationId xmlns:p14="http://schemas.microsoft.com/office/powerpoint/2010/main" val="102153736"/>
+        <p14:creationId xmlns:p14="http://schemas.microsoft.com/office/powerpoint/2010/main" val="2667916991"/>
       </p:ext>
     </p:extLst>
   </p:cSld>
@@ -6272,7 +6439,15 @@
           <a:p>
             <a:r>
               <a:rPr lang="fr-FR" dirty="0" smtClean="0"/>
-              <a:t>Tern.js &amp; Java</a:t>
+              <a:t>TERN IDE &amp; </a:t>
+            </a:r>
+            <a:r>
+              <a:rPr lang="fr-FR" dirty="0" err="1" smtClean="0"/>
+              <a:t>Closure</a:t>
+            </a:r>
+            <a:r>
+              <a:rPr lang="fr-FR" dirty="0" smtClean="0"/>
+              <a:t> Library</a:t>
             </a:r>
             <a:endParaRPr lang="fr-FR" dirty="0"/>
           </a:p>
@@ -6291,134 +6466,200 @@
         <p:spPr/>
         <p:txBody>
           <a:bodyPr>
-            <a:normAutofit fontScale="92500" lnSpcReduction="10000"/>
+            <a:normAutofit/>
           </a:bodyPr>
           <a:lstStyle/>
           <a:p>
             <a:pPr marL="342900" lvl="1" indent="-342900"/>
             <a:r>
               <a:rPr lang="fr-FR" dirty="0" smtClean="0"/>
-              <a:t>tern.js écrits en </a:t>
-            </a:r>
-            <a:r>
-              <a:rPr lang="fr-FR" dirty="0" err="1" smtClean="0"/>
-              <a:t>Javascript</a:t>
-            </a:r>
-            <a:r>
-              <a:rPr lang="fr-FR" dirty="0" smtClean="0"/>
-              <a:t> doit être </a:t>
-            </a:r>
-            <a:r>
-              <a:rPr lang="fr-FR" dirty="0" err="1" smtClean="0"/>
-              <a:t>éxécutés</a:t>
-            </a:r>
-            <a:r>
-              <a:rPr lang="fr-FR" dirty="0" smtClean="0"/>
-              <a:t> dans un contexte Java, pour cela plusieurs solutions :</a:t>
-            </a:r>
-          </a:p>
-          <a:p>
-            <a:pPr marL="742950" lvl="2" indent="-342900"/>
-            <a:r>
-              <a:rPr lang="fr-FR" dirty="0" smtClean="0"/>
-              <a:t>Rhino, </a:t>
-            </a:r>
-          </a:p>
-          <a:p>
-            <a:pPr marL="742950" lvl="2" indent="-342900"/>
-            <a:r>
-              <a:rPr lang="fr-FR" dirty="0" smtClean="0"/>
-              <a:t>Node.js (client serveur), </a:t>
-            </a:r>
-          </a:p>
-          <a:p>
-            <a:pPr marL="742950" lvl="2" indent="-342900"/>
-            <a:r>
-              <a:rPr lang="fr-FR" dirty="0" err="1" smtClean="0"/>
-              <a:t>Nashhorm</a:t>
-            </a:r>
-            <a:r>
-              <a:rPr lang="fr-FR" dirty="0" smtClean="0"/>
-              <a:t>, </a:t>
-            </a:r>
-          </a:p>
-          <a:p>
-            <a:pPr marL="742950" lvl="2" indent="-342900"/>
-            <a:r>
-              <a:rPr lang="fr-FR" dirty="0" err="1" smtClean="0"/>
-              <a:t>Vertx</a:t>
-            </a:r>
+              <a:t>Après avoir </a:t>
+            </a:r>
+            <a:r>
+              <a:rPr lang="fr-FR" dirty="0"/>
+              <a:t>sélectionné le module </a:t>
+            </a:r>
+            <a:r>
+              <a:rPr lang="fr-FR" dirty="0" err="1" smtClean="0"/>
+              <a:t>closure</a:t>
+            </a:r>
+            <a:r>
+              <a:rPr lang="fr-FR" dirty="0" smtClean="0"/>
+              <a:t>, on bénéficie de la complétion sur ce </a:t>
+            </a:r>
+            <a:r>
+              <a:rPr lang="fr-FR" dirty="0" err="1" smtClean="0"/>
+              <a:t>framework</a:t>
+            </a:r>
+            <a:r>
+              <a:rPr lang="fr-FR" dirty="0" smtClean="0"/>
+              <a:t>: : </a:t>
+            </a:r>
+          </a:p>
+          <a:p>
+            <a:pPr marL="342900" lvl="1" indent="-342900"/>
             <a:endParaRPr lang="fr-FR" dirty="0" smtClean="0"/>
           </a:p>
           <a:p>
-            <a:pPr marL="742950" lvl="2" indent="-342900"/>
-            <a:r>
-              <a:rPr lang="fr-FR" dirty="0" smtClean="0"/>
-              <a:t>Chrome</a:t>
-            </a:r>
-          </a:p>
-          <a:p>
             <a:pPr marL="342900" lvl="1" indent="-342900"/>
-            <a:r>
-              <a:rPr lang="fr-FR" dirty="0" smtClean="0"/>
-              <a:t>2 </a:t>
-            </a:r>
-            <a:r>
-              <a:rPr lang="fr-FR" dirty="0" err="1" smtClean="0"/>
-              <a:t>implementations</a:t>
-            </a:r>
-            <a:r>
-              <a:rPr lang="fr-FR" dirty="0" smtClean="0"/>
-              <a:t> du serveur </a:t>
-            </a:r>
-            <a:r>
-              <a:rPr lang="fr-FR" dirty="0" err="1" smtClean="0"/>
+            <a:endParaRPr lang="fr-FR" dirty="0" smtClean="0"/>
+          </a:p>
+          <a:p>
+            <a:pPr marL="342900" lvl="1" indent="-342900"/>
+            <a:endParaRPr lang="fr-FR" dirty="0"/>
+          </a:p>
+          <a:p>
+            <a:pPr marL="342900" lvl="1" indent="-342900"/>
+            <a:endParaRPr lang="fr-FR" dirty="0" smtClean="0"/>
+          </a:p>
+          <a:p>
+            <a:pPr marL="342900" lvl="1" indent="-342900"/>
+            <a:endParaRPr lang="fr-FR" dirty="0"/>
+          </a:p>
+          <a:p>
+            <a:pPr marL="342900" lvl="1" indent="-342900"/>
+            <a:endParaRPr lang="fr-FR" dirty="0" smtClean="0"/>
+          </a:p>
+          <a:p>
+            <a:pPr marL="342900" lvl="1" indent="-342900"/>
+            <a:endParaRPr lang="fr-FR" dirty="0"/>
+          </a:p>
+          <a:p>
+            <a:pPr marL="342900" lvl="1" indent="-342900"/>
+            <a:r>
+              <a:rPr lang="fr-FR" dirty="0" smtClean="0">
+                <a:solidFill>
+                  <a:srgbClr val="FFC000"/>
+                </a:solidFill>
+              </a:rPr>
+              <a:t>►</a:t>
+            </a:r>
+            <a:r>
+              <a:rPr lang="fr-FR" dirty="0" err="1" smtClean="0"/>
+              <a:t>closure</a:t>
+            </a:r>
+            <a:r>
+              <a:rPr lang="fr-FR" dirty="0" smtClean="0"/>
+              <a:t> </a:t>
+            </a:r>
+            <a:r>
+              <a:rPr lang="fr-FR" dirty="0"/>
+              <a:t>est un plugin </a:t>
+            </a:r>
+            <a:r>
+              <a:rPr lang="fr-FR" dirty="0" err="1"/>
               <a:t>tern</a:t>
             </a:r>
             <a:r>
-              <a:rPr lang="fr-FR" dirty="0" smtClean="0"/>
-              <a:t> en Java : </a:t>
-            </a:r>
-          </a:p>
-          <a:p>
-            <a:pPr marL="742950" lvl="2" indent="-342900"/>
-            <a:r>
-              <a:rPr lang="fr-FR" dirty="0" smtClean="0"/>
-              <a:t>Rhino</a:t>
-            </a:r>
-          </a:p>
-          <a:p>
-            <a:pPr marL="742950" lvl="2" indent="-342900"/>
-            <a:r>
-              <a:rPr lang="fr-FR" dirty="0" smtClean="0"/>
-              <a:t>Node.js</a:t>
-            </a:r>
+              <a:rPr lang="fr-FR" dirty="0"/>
+              <a:t>. </a:t>
+            </a:r>
+            <a:r>
+              <a:rPr lang="fr-FR" dirty="0" smtClean="0"/>
+              <a:t>Il se base sur les sources de </a:t>
+            </a:r>
+            <a:r>
+              <a:rPr lang="fr-FR" dirty="0" err="1" smtClean="0"/>
+              <a:t>closure</a:t>
+            </a:r>
+            <a:r>
+              <a:rPr lang="fr-FR" dirty="0" smtClean="0"/>
+              <a:t>. Le </a:t>
+            </a:r>
+            <a:r>
+              <a:rPr lang="fr-FR" dirty="0" err="1" smtClean="0"/>
+              <a:t>hyperlink</a:t>
+            </a:r>
+            <a:r>
+              <a:rPr lang="fr-FR" dirty="0" smtClean="0"/>
+              <a:t> permet d’ouvrir les sources de </a:t>
+            </a:r>
+            <a:r>
+              <a:rPr lang="fr-FR" dirty="0" err="1" smtClean="0"/>
+              <a:t>closure</a:t>
+            </a:r>
+            <a:r>
+              <a:rPr lang="fr-FR" dirty="0" smtClean="0"/>
+              <a:t>.</a:t>
+            </a:r>
+            <a:endParaRPr lang="fr-FR" dirty="0"/>
           </a:p>
           <a:p>
             <a:pPr marL="342900" lvl="1" indent="-342900"/>
-            <a:r>
-              <a:rPr lang="fr-FR" dirty="0" smtClean="0"/>
-              <a:t>Node.js la plus performante.</a:t>
-            </a:r>
+            <a:endParaRPr lang="fr-FR" dirty="0" smtClean="0"/>
           </a:p>
           <a:p>
             <a:pPr marL="342900" lvl="1" indent="-342900"/>
-            <a:r>
-              <a:rPr lang="fr-FR" dirty="0"/>
-              <a:t>A tester avec </a:t>
-            </a:r>
-            <a:r>
-              <a:rPr lang="fr-FR" dirty="0" err="1"/>
-              <a:t>Nashhorm</a:t>
-            </a:r>
+            <a:endParaRPr lang="fr-FR" dirty="0"/>
+          </a:p>
+          <a:p>
+            <a:pPr marL="342900" lvl="1" indent="-342900"/>
             <a:endParaRPr lang="fr-FR" dirty="0" smtClean="0"/>
           </a:p>
-        </p:txBody>
-      </p:sp>
+          <a:p>
+            <a:pPr marL="342900" lvl="1" indent="-342900"/>
+            <a:endParaRPr lang="fr-FR" dirty="0"/>
+          </a:p>
+        </p:txBody>
+      </p:sp>
+      <p:pic>
+        <p:nvPicPr>
+          <p:cNvPr id="16386" name="Picture 2"/>
+          <p:cNvPicPr>
+            <a:picLocks noChangeAspect="1" noChangeArrowheads="1"/>
+          </p:cNvPicPr>
+          <p:nvPr/>
+        </p:nvPicPr>
+        <p:blipFill>
+          <a:blip r:embed="rId2">
+            <a:extLst>
+              <a:ext uri="{28A0092B-C50C-407E-A947-70E740481C1C}">
+                <a14:useLocalDpi xmlns:a14="http://schemas.microsoft.com/office/drawing/2010/main" val="0"/>
+              </a:ext>
+            </a:extLst>
+          </a:blip>
+          <a:srcRect/>
+          <a:stretch>
+            <a:fillRect/>
+          </a:stretch>
+        </p:blipFill>
+        <p:spPr bwMode="auto">
+          <a:xfrm>
+            <a:off x="990959" y="2348880"/>
+            <a:ext cx="6864350" cy="2609850"/>
+          </a:xfrm>
+          <a:prstGeom prst="rect">
+            <a:avLst/>
+          </a:prstGeom>
+          <a:noFill/>
+          <a:ln>
+            <a:noFill/>
+          </a:ln>
+          <a:extLst>
+            <a:ext uri="{909E8E84-426E-40DD-AFC4-6F175D3DCCD1}">
+              <a14:hiddenFill xmlns:a14="http://schemas.microsoft.com/office/drawing/2010/main">
+                <a:solidFill>
+                  <a:schemeClr val="accent1"/>
+                </a:solidFill>
+              </a14:hiddenFill>
+            </a:ext>
+            <a:ext uri="{91240B29-F687-4F45-9708-019B960494DF}">
+              <a14:hiddenLine xmlns:a14="http://schemas.microsoft.com/office/drawing/2010/main" w="9525">
+                <a:solidFill>
+                  <a:schemeClr val="tx1"/>
+                </a:solidFill>
+                <a:miter lim="800000"/>
+                <a:headEnd/>
+                <a:tailEnd/>
+              </a14:hiddenLine>
+            </a:ext>
+          </a:extLst>
+        </p:spPr>
+      </p:pic>
     </p:spTree>
     <p:extLst>
       <p:ext uri="{BB962C8B-B14F-4D97-AF65-F5344CB8AC3E}">
-        <p14:creationId xmlns:p14="http://schemas.microsoft.com/office/powerpoint/2010/main" val="3134940998"/>
+        <p14:creationId xmlns:p14="http://schemas.microsoft.com/office/powerpoint/2010/main" val="1693652435"/>
       </p:ext>
     </p:extLst>
   </p:cSld>
@@ -6461,8 +6702,12 @@
           <a:lstStyle/>
           <a:p>
             <a:r>
-              <a:rPr lang="fr-FR" dirty="0" smtClean="0"/>
-              <a:t>Tern.js &amp; Java – Node.js</a:t>
+              <a:rPr lang="fr-FR" dirty="0" err="1" smtClean="0"/>
+              <a:t>Tern</a:t>
+            </a:r>
+            <a:r>
+              <a:rPr lang="fr-FR" dirty="0" smtClean="0"/>
+              <a:t> Java - Comment ca marche?</a:t>
             </a:r>
             <a:endParaRPr lang="fr-FR" dirty="0"/>
           </a:p>
@@ -6488,23 +6733,85 @@
             <a:pPr marL="342900" lvl="1" indent="-342900"/>
             <a:r>
               <a:rPr lang="fr-FR" dirty="0" smtClean="0"/>
-              <a:t>Faire </a:t>
-            </a:r>
-            <a:r>
-              <a:rPr lang="fr-FR" dirty="0" err="1" smtClean="0"/>
-              <a:t>schema</a:t>
-            </a:r>
-            <a:r>
-              <a:rPr lang="fr-FR" dirty="0" smtClean="0"/>
-              <a:t> Node.js</a:t>
-            </a:r>
-          </a:p>
-        </p:txBody>
-      </p:sp>
+              <a:t>Communication entre la complétion Eclipse et </a:t>
+            </a:r>
+            <a:r>
+              <a:rPr lang="fr-FR" dirty="0" err="1" smtClean="0"/>
+              <a:t>tern</a:t>
+            </a:r>
+            <a:r>
+              <a:rPr lang="fr-FR" dirty="0" smtClean="0"/>
+              <a:t>  :</a:t>
+            </a:r>
+          </a:p>
+          <a:p>
+            <a:pPr marL="342900" lvl="1" indent="-342900"/>
+            <a:endParaRPr lang="fr-FR" dirty="0" smtClean="0"/>
+          </a:p>
+          <a:p>
+            <a:pPr marL="342900" lvl="1" indent="-342900"/>
+            <a:endParaRPr lang="fr-FR" dirty="0"/>
+          </a:p>
+        </p:txBody>
+      </p:sp>
+      <p:pic>
+        <p:nvPicPr>
+          <p:cNvPr id="12290" name="Picture 2"/>
+          <p:cNvPicPr>
+            <a:picLocks noChangeAspect="1" noChangeArrowheads="1"/>
+          </p:cNvPicPr>
+          <p:nvPr/>
+        </p:nvPicPr>
+        <p:blipFill>
+          <a:blip r:embed="rId2">
+            <a:extLst>
+              <a:ext uri="{28A0092B-C50C-407E-A947-70E740481C1C}">
+                <a14:useLocalDpi xmlns:a14="http://schemas.microsoft.com/office/drawing/2010/main" val="0"/>
+              </a:ext>
+            </a:extLst>
+          </a:blip>
+          <a:srcRect/>
+          <a:stretch>
+            <a:fillRect/>
+          </a:stretch>
+        </p:blipFill>
+        <p:spPr bwMode="auto">
+          <a:xfrm>
+            <a:off x="1162050" y="2060848"/>
+            <a:ext cx="6819900" cy="3181350"/>
+          </a:xfrm>
+          <a:prstGeom prst="rect">
+            <a:avLst/>
+          </a:prstGeom>
+          <a:noFill/>
+          <a:ln>
+            <a:noFill/>
+          </a:ln>
+          <a:extLst>
+            <a:ext uri="{909E8E84-426E-40DD-AFC4-6F175D3DCCD1}">
+              <a14:hiddenFill xmlns:a14="http://schemas.microsoft.com/office/drawing/2010/main">
+                <a:solidFill>
+                  <a:schemeClr val="accent1"/>
+                </a:solidFill>
+              </a14:hiddenFill>
+            </a:ext>
+            <a:ext uri="{91240B29-F687-4F45-9708-019B960494DF}">
+              <a14:hiddenLine xmlns:a14="http://schemas.microsoft.com/office/drawing/2010/main" w="9525">
+                <a:solidFill>
+                  <a:schemeClr val="tx1"/>
+                </a:solidFill>
+                <a:miter lim="800000"/>
+                <a:headEnd/>
+                <a:tailEnd/>
+              </a14:hiddenLine>
+            </a:ext>
+          </a:extLst>
+        </p:spPr>
+      </p:pic>
     </p:spTree>
     <p:extLst>
       <p:ext uri="{BB962C8B-B14F-4D97-AF65-F5344CB8AC3E}">
-        <p14:creationId xmlns:p14="http://schemas.microsoft.com/office/powerpoint/2010/main" val="1152627646"/>
+        <p14:creationId xmlns:p14="http://schemas.microsoft.com/office/powerpoint/2010/main" val="3723258937"/>
       </p:ext>
     </p:extLst>
   </p:cSld>
@@ -6547,12 +6854,16 @@
           <a:lstStyle/>
           <a:p>
             <a:r>
-              <a:rPr lang="fr-FR" dirty="0" smtClean="0"/>
-              <a:t>Tern.java </a:t>
-            </a:r>
-            <a:r>
-              <a:rPr lang="fr-FR" smtClean="0"/>
-              <a:t>&amp; Eclipse</a:t>
+              <a:rPr lang="fr-FR" dirty="0" err="1"/>
+              <a:t>Tern</a:t>
+            </a:r>
+            <a:r>
+              <a:rPr lang="fr-FR" dirty="0"/>
+              <a:t> Java - Comment </a:t>
+            </a:r>
+            <a:r>
+              <a:rPr lang="fr-FR" dirty="0" smtClean="0"/>
+              <a:t>ca marche?</a:t>
             </a:r>
             <a:endParaRPr lang="fr-FR" dirty="0"/>
           </a:p>
@@ -6570,116 +6881,193 @@
         </p:nvSpPr>
         <p:spPr/>
         <p:txBody>
-          <a:bodyPr/>
-          <a:lstStyle/>
-          <a:p>
-            <a:r>
-              <a:rPr lang="fr-FR" dirty="0" smtClean="0"/>
-              <a:t>tern.java (</a:t>
-            </a:r>
-            <a:r>
-              <a:rPr lang="fr-FR" dirty="0" err="1" smtClean="0"/>
-              <a:t>eclipse</a:t>
-            </a:r>
-            <a:r>
-              <a:rPr lang="fr-FR" dirty="0" smtClean="0"/>
-              <a:t>) fournit :</a:t>
-            </a:r>
-          </a:p>
-          <a:p>
-            <a:pPr lvl="1"/>
-            <a:r>
-              <a:rPr lang="fr-FR" dirty="0" smtClean="0"/>
-              <a:t>des plugins Eclipse pour l’IDE Eclipse qui utilise tern.java (</a:t>
-            </a:r>
-            <a:r>
-              <a:rPr lang="fr-FR" dirty="0" err="1" smtClean="0"/>
-              <a:t>core</a:t>
-            </a:r>
-            <a:r>
-              <a:rPr lang="fr-FR" dirty="0" smtClean="0"/>
-              <a:t>)</a:t>
-            </a:r>
-          </a:p>
-          <a:p>
-            <a:pPr lvl="1"/>
-            <a:r>
-              <a:rPr lang="fr-FR" dirty="0" smtClean="0"/>
-              <a:t>Un plugin JSDT qui </a:t>
-            </a:r>
-            <a:r>
-              <a:rPr lang="fr-FR" dirty="0" err="1" smtClean="0"/>
-              <a:t>éténd</a:t>
-            </a:r>
-            <a:r>
-              <a:rPr lang="fr-FR" dirty="0" smtClean="0"/>
-              <a:t> la </a:t>
-            </a:r>
-            <a:r>
-              <a:rPr lang="fr-FR" dirty="0" err="1" smtClean="0"/>
+          <a:bodyPr>
+            <a:normAutofit lnSpcReduction="10000"/>
+          </a:bodyPr>
+          <a:lstStyle/>
+          <a:p>
+            <a:pPr marL="342900" lvl="1" indent="-342900"/>
+            <a:r>
+              <a:rPr lang="fr-FR" dirty="0" smtClean="0"/>
+              <a:t>serveur </a:t>
+            </a:r>
+            <a:r>
+              <a:rPr lang="fr-FR" dirty="0" err="1" smtClean="0"/>
+              <a:t>tern</a:t>
+            </a:r>
+            <a:r>
+              <a:rPr lang="fr-FR" dirty="0" smtClean="0"/>
+              <a:t> lancé : tern.js est exécuté dans Eclipse IDE via Node.js</a:t>
+            </a:r>
+          </a:p>
+          <a:p>
+            <a:pPr marL="342900" lvl="1" indent="-342900"/>
+            <a:r>
+              <a:rPr lang="fr-FR" dirty="0" smtClean="0"/>
+              <a:t>Ici le server </a:t>
+            </a:r>
+            <a:r>
+              <a:rPr lang="fr-FR" dirty="0" err="1" smtClean="0"/>
+              <a:t>tern</a:t>
+            </a:r>
+            <a:r>
+              <a:rPr lang="fr-FR" dirty="0" smtClean="0"/>
+              <a:t> charge les JSON Type </a:t>
+            </a:r>
+            <a:r>
+              <a:rPr lang="fr-FR" dirty="0" err="1" smtClean="0"/>
+              <a:t>Definitions</a:t>
+            </a:r>
+            <a:r>
+              <a:rPr lang="fr-FR" dirty="0" smtClean="0"/>
+              <a:t> emacs5, browser et </a:t>
+            </a:r>
+            <a:r>
+              <a:rPr lang="fr-FR" dirty="0" err="1" smtClean="0"/>
+              <a:t>jquery</a:t>
+            </a:r>
+            <a:endParaRPr lang="fr-FR" dirty="0" smtClean="0"/>
+          </a:p>
+          <a:p>
+            <a:pPr marL="342900" lvl="1" indent="-342900"/>
+            <a:r>
+              <a:rPr lang="fr-FR" dirty="0" smtClean="0"/>
+              <a:t>communication entre la complétion Eclipse et le serveur </a:t>
+            </a:r>
+            <a:r>
+              <a:rPr lang="fr-FR" dirty="0" err="1" smtClean="0"/>
+              <a:t>tern</a:t>
+            </a:r>
+            <a:r>
+              <a:rPr lang="fr-FR" dirty="0" smtClean="0"/>
+              <a:t> s’effectue via JSON : </a:t>
+            </a:r>
+          </a:p>
+          <a:p>
+            <a:pPr marL="1200150" lvl="3" indent="-342900"/>
+            <a:r>
+              <a:rPr lang="fr-FR" dirty="0" smtClean="0"/>
+              <a:t>2 requêtes JSON:</a:t>
+            </a:r>
+          </a:p>
+          <a:p>
+            <a:pPr marL="1657350" lvl="4" indent="-342900"/>
+            <a:r>
+              <a:rPr lang="fr-FR" dirty="0" smtClean="0"/>
+              <a:t>requête </a:t>
+            </a:r>
+            <a:r>
+              <a:rPr lang="fr-FR" b="1" dirty="0" smtClean="0"/>
+              <a:t>files</a:t>
+            </a:r>
+            <a:r>
+              <a:rPr lang="fr-FR" dirty="0" smtClean="0"/>
+              <a:t>: envoie le contenu de l’éditeur et d’autres fichiers (si besoin)</a:t>
+            </a:r>
+          </a:p>
+          <a:p>
+            <a:pPr marL="1657350" lvl="4" indent="-342900"/>
+            <a:r>
+              <a:rPr lang="fr-FR" dirty="0" smtClean="0"/>
+              <a:t>Requête </a:t>
+            </a:r>
+            <a:r>
+              <a:rPr lang="fr-FR" b="1" dirty="0" err="1" smtClean="0"/>
               <a:t>completion</a:t>
             </a:r>
             <a:r>
               <a:rPr lang="fr-FR" dirty="0" smtClean="0"/>
-              <a:t>, </a:t>
-            </a:r>
-            <a:r>
-              <a:rPr lang="fr-FR" dirty="0" err="1" smtClean="0"/>
-              <a:t>text</a:t>
-            </a:r>
-            <a:r>
-              <a:rPr lang="fr-FR" dirty="0" smtClean="0"/>
+              <a:t>:</a:t>
+            </a:r>
+            <a:r>
+              <a:rPr lang="fr-FR" b="1" dirty="0" smtClean="0"/>
               <a:t> </a:t>
             </a:r>
             <a:r>
-              <a:rPr lang="fr-FR" dirty="0" err="1" smtClean="0"/>
-              <a:t>hover</a:t>
-            </a:r>
-            <a:r>
-              <a:rPr lang="fr-FR" dirty="0" smtClean="0"/>
-              <a:t> pour utilise </a:t>
-            </a:r>
-            <a:r>
-              <a:rPr lang="fr-FR" dirty="0" err="1" smtClean="0"/>
-              <a:t>tern</a:t>
-            </a:r>
-            <a:r>
-              <a:rPr lang="fr-FR" dirty="0" smtClean="0"/>
-              <a:t> dans l’</a:t>
-            </a:r>
-            <a:r>
-              <a:rPr lang="fr-FR" dirty="0" err="1" smtClean="0"/>
-              <a:t>editeur</a:t>
-            </a:r>
-            <a:r>
-              <a:rPr lang="fr-FR" dirty="0" smtClean="0"/>
+              <a:rPr lang="fr-FR" dirty="0" smtClean="0"/>
+              <a:t> envoie une requête de type </a:t>
+            </a:r>
+            <a:r>
+              <a:rPr lang="fr-FR" b="1" dirty="0" err="1"/>
+              <a:t>completion</a:t>
+            </a:r>
+            <a:r>
+              <a:rPr lang="fr-FR" b="1" dirty="0"/>
               <a:t> </a:t>
             </a:r>
             <a:r>
-              <a:rPr lang="fr-FR" dirty="0" err="1" smtClean="0"/>
-              <a:t>Javascript</a:t>
-            </a:r>
-            <a:r>
-              <a:rPr lang="fr-FR" dirty="0" smtClean="0"/>
-              <a:t> JSDT</a:t>
-            </a:r>
-          </a:p>
-          <a:p>
-            <a:pPr lvl="1"/>
-            <a:r>
-              <a:rPr lang="fr-FR" dirty="0" smtClean="0"/>
-              <a:t>Tern.java (</a:t>
-            </a:r>
-            <a:r>
-              <a:rPr lang="fr-FR" dirty="0" err="1" smtClean="0"/>
-              <a:t>eclipse</a:t>
-            </a:r>
-            <a:r>
-              <a:rPr lang="fr-FR" dirty="0" smtClean="0"/>
-              <a:t>) n’est pas lié à JSDT, il peut être utilisé dans d’autres éditeurs JavaScript.</a:t>
-            </a:r>
-          </a:p>
-          <a:p>
+              <a:rPr lang="fr-FR" dirty="0" smtClean="0"/>
+              <a:t>:</a:t>
+            </a:r>
+            <a:endParaRPr lang="fr-FR" dirty="0" smtClean="0"/>
+          </a:p>
+          <a:p>
+            <a:pPr marL="2114550" lvl="5" indent="-342900"/>
+            <a:r>
+              <a:rPr lang="fr-FR" b="1" dirty="0" smtClean="0"/>
+              <a:t>type</a:t>
+            </a:r>
+            <a:r>
+              <a:rPr lang="fr-FR" dirty="0" smtClean="0"/>
+              <a:t>: </a:t>
+            </a:r>
+            <a:r>
+              <a:rPr lang="fr-FR" dirty="0" err="1" smtClean="0"/>
+              <a:t>completion</a:t>
+            </a:r>
+            <a:endParaRPr lang="fr-FR" dirty="0" smtClean="0"/>
+          </a:p>
+          <a:p>
+            <a:pPr marL="2114550" lvl="5" indent="-342900"/>
+            <a:r>
+              <a:rPr lang="fr-FR" b="1" dirty="0" smtClean="0"/>
+              <a:t>file</a:t>
+            </a:r>
+            <a:r>
+              <a:rPr lang="fr-FR" dirty="0" smtClean="0"/>
+              <a:t>: nom du fichier</a:t>
+            </a:r>
+          </a:p>
+          <a:p>
+            <a:pPr marL="2114550" lvl="5" indent="-342900"/>
+            <a:r>
+              <a:rPr lang="fr-FR" b="1" dirty="0" smtClean="0"/>
+              <a:t>end</a:t>
+            </a:r>
+            <a:r>
+              <a:rPr lang="fr-FR" dirty="0" smtClean="0"/>
+              <a:t>: offset ou la complétion est lancée.</a:t>
+            </a:r>
+          </a:p>
+          <a:p>
+            <a:pPr marL="1200150" lvl="3" indent="-342900"/>
+            <a:r>
+              <a:rPr lang="fr-FR" dirty="0" smtClean="0"/>
+              <a:t>Une réponse JSON:</a:t>
+            </a:r>
+          </a:p>
+          <a:p>
+            <a:pPr marL="1657350" lvl="4" indent="-342900"/>
+            <a:r>
+              <a:rPr lang="fr-FR" b="1" dirty="0" err="1" smtClean="0"/>
+              <a:t>completions</a:t>
+            </a:r>
+            <a:r>
+              <a:rPr lang="fr-FR" dirty="0" smtClean="0"/>
+              <a:t> : tableau avec le résultat de la </a:t>
+            </a:r>
+            <a:r>
+              <a:rPr lang="fr-FR" dirty="0" err="1" smtClean="0"/>
+              <a:t>completion</a:t>
+            </a:r>
+            <a:r>
+              <a:rPr lang="fr-FR" dirty="0" smtClean="0"/>
+              <a:t>.</a:t>
+            </a:r>
+            <a:endParaRPr lang="fr-FR" b="1" dirty="0" smtClean="0"/>
+          </a:p>
+          <a:p>
+            <a:pPr marL="342900" lvl="1" indent="-342900"/>
             <a:endParaRPr lang="fr-FR" dirty="0"/>
           </a:p>
         </p:txBody>
@@ -6687,7 +7075,7 @@
     </p:spTree>
     <p:extLst>
       <p:ext uri="{BB962C8B-B14F-4D97-AF65-F5344CB8AC3E}">
-        <p14:creationId xmlns:p14="http://schemas.microsoft.com/office/powerpoint/2010/main" val="3541111988"/>
+        <p14:creationId xmlns:p14="http://schemas.microsoft.com/office/powerpoint/2010/main" val="1337869874"/>
       </p:ext>
     </p:extLst>
   </p:cSld>
@@ -6730,20 +7118,16 @@
           <a:lstStyle/>
           <a:p>
             <a:r>
-              <a:rPr lang="fr-FR" dirty="0" smtClean="0"/>
-              <a:t>Tern.java – </a:t>
-            </a:r>
-            <a:r>
-              <a:rPr lang="fr-FR" dirty="0" err="1" smtClean="0"/>
-              <a:t>Getting</a:t>
-            </a:r>
-            <a:r>
-              <a:rPr lang="fr-FR" dirty="0" smtClean="0"/>
-              <a:t> </a:t>
-            </a:r>
-            <a:r>
-              <a:rPr lang="fr-FR" dirty="0" err="1" smtClean="0"/>
-              <a:t>Started</a:t>
+              <a:rPr lang="fr-FR" dirty="0" err="1"/>
+              <a:t>Tern</a:t>
+            </a:r>
+            <a:r>
+              <a:rPr lang="fr-FR" dirty="0"/>
+              <a:t> Java - Comment </a:t>
+            </a:r>
+            <a:r>
+              <a:rPr lang="fr-FR" dirty="0" smtClean="0"/>
+              <a:t>ca marche?</a:t>
             </a:r>
             <a:endParaRPr lang="fr-FR" dirty="0"/>
           </a:p>
@@ -6761,21 +7145,174 @@
         </p:nvSpPr>
         <p:spPr/>
         <p:txBody>
-          <a:bodyPr/>
-          <a:lstStyle/>
-          <a:p>
-            <a:r>
-              <a:rPr lang="fr-FR" dirty="0" smtClean="0"/>
-              <a:t>tern.java</a:t>
-            </a:r>
+          <a:bodyPr>
+            <a:normAutofit/>
+          </a:bodyPr>
+          <a:lstStyle/>
+          <a:p>
+            <a:pPr marL="342900" lvl="1" indent="-342900"/>
+            <a:r>
+              <a:rPr lang="fr-FR" dirty="0" smtClean="0"/>
+              <a:t>Cocher </a:t>
+            </a:r>
+            <a:r>
+              <a:rPr lang="fr-FR" dirty="0" err="1" smtClean="0"/>
+              <a:t>Tern</a:t>
+            </a:r>
+            <a:r>
+              <a:rPr lang="fr-FR" dirty="0" smtClean="0"/>
+              <a:t> console dans les propriétés du projet </a:t>
+            </a:r>
+            <a:r>
+              <a:rPr lang="fr-FR" dirty="0" err="1" smtClean="0"/>
+              <a:t>Tern</a:t>
+            </a:r>
+            <a:r>
+              <a:rPr lang="fr-FR" dirty="0" smtClean="0"/>
+              <a:t> -&gt; Console :</a:t>
+            </a:r>
+          </a:p>
+          <a:p>
+            <a:pPr marL="342900" lvl="1" indent="-342900"/>
             <a:endParaRPr lang="fr-FR" dirty="0"/>
           </a:p>
-        </p:txBody>
-      </p:sp>
+          <a:p>
+            <a:pPr marL="342900" lvl="1" indent="-342900"/>
+            <a:endParaRPr lang="fr-FR" dirty="0" smtClean="0"/>
+          </a:p>
+          <a:p>
+            <a:pPr marL="342900" lvl="1" indent="-342900"/>
+            <a:endParaRPr lang="fr-FR" dirty="0"/>
+          </a:p>
+          <a:p>
+            <a:pPr marL="342900" lvl="1" indent="-342900"/>
+            <a:r>
+              <a:rPr lang="fr-FR" dirty="0" smtClean="0"/>
+              <a:t>La console Eclipse affiche les requêtes/réponses JSON:</a:t>
+            </a:r>
+          </a:p>
+          <a:p>
+            <a:pPr marL="342900" lvl="1" indent="-342900"/>
+            <a:endParaRPr lang="fr-FR" b="1" dirty="0" smtClean="0"/>
+          </a:p>
+          <a:p>
+            <a:pPr marL="342900" lvl="1" indent="-342900"/>
+            <a:endParaRPr lang="fr-FR" dirty="0"/>
+          </a:p>
+        </p:txBody>
+      </p:sp>
+      <p:pic>
+        <p:nvPicPr>
+          <p:cNvPr id="11266" name="Picture 2"/>
+          <p:cNvPicPr>
+            <a:picLocks noChangeAspect="1" noChangeArrowheads="1"/>
+          </p:cNvPicPr>
+          <p:nvPr/>
+        </p:nvPicPr>
+        <p:blipFill>
+          <a:blip r:embed="rId2">
+            <a:extLst>
+              <a:ext uri="{28A0092B-C50C-407E-A947-70E740481C1C}">
+                <a14:useLocalDpi xmlns:a14="http://schemas.microsoft.com/office/drawing/2010/main" val="0"/>
+              </a:ext>
+            </a:extLst>
+          </a:blip>
+          <a:srcRect/>
+          <a:stretch>
+            <a:fillRect/>
+          </a:stretch>
+        </p:blipFill>
+        <p:spPr bwMode="auto">
+          <a:xfrm>
+            <a:off x="1691681" y="1988841"/>
+            <a:ext cx="2736303" cy="1154706"/>
+          </a:xfrm>
+          <a:prstGeom prst="rect">
+            <a:avLst/>
+          </a:prstGeom>
+          <a:noFill/>
+          <a:ln>
+            <a:noFill/>
+          </a:ln>
+          <a:extLst>
+            <a:ext uri="{909E8E84-426E-40DD-AFC4-6F175D3DCCD1}">
+              <a14:hiddenFill xmlns:a14="http://schemas.microsoft.com/office/drawing/2010/main">
+                <a:solidFill>
+                  <a:schemeClr val="accent1"/>
+                </a:solidFill>
+              </a14:hiddenFill>
+            </a:ext>
+            <a:ext uri="{91240B29-F687-4F45-9708-019B960494DF}">
+              <a14:hiddenLine xmlns:a14="http://schemas.microsoft.com/office/drawing/2010/main" w="9525">
+                <a:solidFill>
+                  <a:schemeClr val="tx1"/>
+                </a:solidFill>
+                <a:miter lim="800000"/>
+                <a:headEnd/>
+                <a:tailEnd/>
+              </a14:hiddenLine>
+            </a:ext>
+          </a:extLst>
+        </p:spPr>
+      </p:pic>
+      <p:pic>
+        <p:nvPicPr>
+          <p:cNvPr id="11267" name="Picture 3"/>
+          <p:cNvPicPr>
+            <a:picLocks noChangeAspect="1" noChangeArrowheads="1"/>
+          </p:cNvPicPr>
+          <p:nvPr/>
+        </p:nvPicPr>
+        <p:blipFill>
+          <a:blip r:embed="rId3">
+            <a:extLst>
+              <a:ext uri="{28A0092B-C50C-407E-A947-70E740481C1C}">
+                <a14:useLocalDpi xmlns:a14="http://schemas.microsoft.com/office/drawing/2010/main" val="0"/>
+              </a:ext>
+            </a:extLst>
+          </a:blip>
+          <a:srcRect/>
+          <a:stretch>
+            <a:fillRect/>
+          </a:stretch>
+        </p:blipFill>
+        <p:spPr bwMode="auto">
+          <a:xfrm>
+            <a:off x="176213" y="3789040"/>
+            <a:ext cx="8791575" cy="2876550"/>
+          </a:xfrm>
+          <a:prstGeom prst="rect">
+            <a:avLst/>
+          </a:prstGeom>
+          <a:noFill/>
+          <a:ln>
+            <a:noFill/>
+          </a:ln>
+          <a:extLst>
+            <a:ext uri="{909E8E84-426E-40DD-AFC4-6F175D3DCCD1}">
+              <a14:hiddenFill xmlns:a14="http://schemas.microsoft.com/office/drawing/2010/main">
+                <a:solidFill>
+                  <a:schemeClr val="accent1"/>
+                </a:solidFill>
+              </a14:hiddenFill>
+            </a:ext>
+            <a:ext uri="{91240B29-F687-4F45-9708-019B960494DF}">
+              <a14:hiddenLine xmlns:a14="http://schemas.microsoft.com/office/drawing/2010/main" w="9525">
+                <a:solidFill>
+                  <a:schemeClr val="tx1"/>
+                </a:solidFill>
+                <a:miter lim="800000"/>
+                <a:headEnd/>
+                <a:tailEnd/>
+              </a14:hiddenLine>
+            </a:ext>
+          </a:extLst>
+        </p:spPr>
+      </p:pic>
     </p:spTree>
     <p:extLst>
       <p:ext uri="{BB962C8B-B14F-4D97-AF65-F5344CB8AC3E}">
-        <p14:creationId xmlns:p14="http://schemas.microsoft.com/office/powerpoint/2010/main" val="1307568318"/>
+        <p14:creationId xmlns:p14="http://schemas.microsoft.com/office/powerpoint/2010/main" val="493232186"/>
       </p:ext>
     </p:extLst>
   </p:cSld>
@@ -6819,11 +7356,11 @@
           <a:p>
             <a:r>
               <a:rPr lang="fr-FR" dirty="0" smtClean="0"/>
-              <a:t>Tern.java – </a:t>
-            </a:r>
-            <a:r>
-              <a:rPr lang="fr-FR" dirty="0" err="1" smtClean="0"/>
-              <a:t>Completion</a:t>
+              <a:t>Implémentation Serveur </a:t>
+            </a:r>
+            <a:r>
+              <a:rPr lang="fr-FR" dirty="0" err="1" smtClean="0"/>
+              <a:t>tern</a:t>
             </a:r>
             <a:endParaRPr lang="fr-FR" dirty="0"/>
           </a:p>
@@ -6841,17 +7378,163 @@
         </p:nvSpPr>
         <p:spPr/>
         <p:txBody>
-          <a:bodyPr/>
-          <a:lstStyle/>
-          <a:p>
-            <a:endParaRPr lang="fr-FR" dirty="0"/>
+          <a:bodyPr>
+            <a:normAutofit fontScale="85000" lnSpcReduction="10000"/>
+          </a:bodyPr>
+          <a:lstStyle/>
+          <a:p>
+            <a:pPr marL="342900" lvl="1" indent="-342900"/>
+            <a:r>
+              <a:rPr lang="fr-FR" dirty="0" smtClean="0"/>
+              <a:t>tern.js écrits en </a:t>
+            </a:r>
+            <a:r>
+              <a:rPr lang="fr-FR" dirty="0" smtClean="0"/>
+              <a:t>JavaScript </a:t>
+            </a:r>
+            <a:r>
+              <a:rPr lang="fr-FR" dirty="0" smtClean="0"/>
+              <a:t>doit être </a:t>
+            </a:r>
+            <a:r>
+              <a:rPr lang="fr-FR" dirty="0" smtClean="0"/>
+              <a:t>e</a:t>
+            </a:r>
+            <a:r>
+              <a:rPr lang="fr-FR" dirty="0" smtClean="0"/>
+              <a:t>xécuté </a:t>
+            </a:r>
+            <a:r>
+              <a:rPr lang="fr-FR" dirty="0" smtClean="0"/>
+              <a:t>dans un contexte Java, pour cela plusieurs solutions :</a:t>
+            </a:r>
+          </a:p>
+          <a:p>
+            <a:pPr marL="742950" lvl="2" indent="-342900"/>
+            <a:r>
+              <a:rPr lang="fr-FR" dirty="0" smtClean="0"/>
+              <a:t>Rhino, </a:t>
+            </a:r>
+          </a:p>
+          <a:p>
+            <a:pPr marL="742950" lvl="2" indent="-342900"/>
+            <a:r>
+              <a:rPr lang="fr-FR" dirty="0" smtClean="0"/>
+              <a:t>Node.js (client serveur), </a:t>
+            </a:r>
+          </a:p>
+          <a:p>
+            <a:pPr marL="742950" lvl="2" indent="-342900"/>
+            <a:r>
+              <a:rPr lang="fr-FR" dirty="0" err="1" smtClean="0"/>
+              <a:t>Nashhorm</a:t>
+            </a:r>
+            <a:r>
+              <a:rPr lang="fr-FR" dirty="0" smtClean="0"/>
+              <a:t>, </a:t>
+            </a:r>
+          </a:p>
+          <a:p>
+            <a:pPr marL="742950" lvl="2" indent="-342900"/>
+            <a:r>
+              <a:rPr lang="fr-FR" dirty="0" err="1" smtClean="0"/>
+              <a:t>Vertx</a:t>
+            </a:r>
+            <a:endParaRPr lang="fr-FR" dirty="0" smtClean="0"/>
+          </a:p>
+          <a:p>
+            <a:pPr marL="742950" lvl="2" indent="-342900"/>
+            <a:r>
+              <a:rPr lang="fr-FR" dirty="0" smtClean="0"/>
+              <a:t>Chrome, </a:t>
+            </a:r>
+            <a:r>
+              <a:rPr lang="fr-FR" dirty="0" err="1" smtClean="0"/>
+              <a:t>etc</a:t>
+            </a:r>
+            <a:endParaRPr lang="fr-FR" dirty="0" smtClean="0"/>
+          </a:p>
+          <a:p>
+            <a:pPr marL="342900" lvl="1" indent="-342900"/>
+            <a:r>
+              <a:rPr lang="fr-FR" dirty="0" err="1" smtClean="0"/>
+              <a:t>Aujoud’hui</a:t>
+            </a:r>
+            <a:r>
+              <a:rPr lang="fr-FR" dirty="0" smtClean="0"/>
+              <a:t> il existe 2 implémentations </a:t>
+            </a:r>
+            <a:r>
+              <a:rPr lang="fr-FR" dirty="0" smtClean="0"/>
+              <a:t>du serveur </a:t>
+            </a:r>
+            <a:r>
+              <a:rPr lang="fr-FR" dirty="0" err="1" smtClean="0"/>
+              <a:t>tern</a:t>
+            </a:r>
+            <a:r>
+              <a:rPr lang="fr-FR" dirty="0" smtClean="0"/>
+              <a:t> en Java : </a:t>
+            </a:r>
+          </a:p>
+          <a:p>
+            <a:pPr marL="742950" lvl="2" indent="-342900"/>
+            <a:r>
+              <a:rPr lang="fr-FR" dirty="0" smtClean="0"/>
+              <a:t>Rhino</a:t>
+            </a:r>
+          </a:p>
+          <a:p>
+            <a:pPr marL="742950" lvl="2" indent="-342900"/>
+            <a:r>
+              <a:rPr lang="fr-FR" dirty="0" smtClean="0"/>
+              <a:t>Node.js</a:t>
+            </a:r>
+          </a:p>
+          <a:p>
+            <a:pPr marL="342900" lvl="1" indent="-342900"/>
+            <a:r>
+              <a:rPr lang="fr-FR" dirty="0" err="1" smtClean="0"/>
+              <a:t>Tern</a:t>
+            </a:r>
+            <a:r>
+              <a:rPr lang="fr-FR" dirty="0" smtClean="0"/>
+              <a:t> IDE utilise Node.js car :</a:t>
+            </a:r>
+          </a:p>
+          <a:p>
+            <a:pPr marL="742950" lvl="2" indent="-342900"/>
+            <a:r>
+              <a:rPr lang="fr-FR" dirty="0" smtClean="0"/>
+              <a:t> très performant.</a:t>
+            </a:r>
+          </a:p>
+          <a:p>
+            <a:pPr marL="742950" lvl="2" indent="-342900"/>
+            <a:r>
+              <a:rPr lang="fr-FR" dirty="0" smtClean="0"/>
+              <a:t>Tern.js est très gourmand en mémoire, Rhino ne supporte pas cette contrainte.</a:t>
+            </a:r>
+            <a:endParaRPr lang="fr-FR" dirty="0" smtClean="0"/>
+          </a:p>
+          <a:p>
+            <a:pPr marL="342900" lvl="1" indent="-342900"/>
+            <a:r>
+              <a:rPr lang="fr-FR" dirty="0"/>
+              <a:t>A tester avec </a:t>
+            </a:r>
+            <a:r>
+              <a:rPr lang="fr-FR" dirty="0" err="1"/>
+              <a:t>Nashhorm</a:t>
+            </a:r>
+            <a:endParaRPr lang="fr-FR" dirty="0" smtClean="0"/>
           </a:p>
         </p:txBody>
       </p:sp>
     </p:spTree>
     <p:extLst>
       <p:ext uri="{BB962C8B-B14F-4D97-AF65-F5344CB8AC3E}">
-        <p14:creationId xmlns:p14="http://schemas.microsoft.com/office/powerpoint/2010/main" val="606268164"/>
+        <p14:creationId xmlns:p14="http://schemas.microsoft.com/office/powerpoint/2010/main" val="3134940998"/>
       </p:ext>
     </p:extLst>
   </p:cSld>
@@ -6895,11 +7578,19 @@
           <a:p>
             <a:r>
               <a:rPr lang="fr-FR" dirty="0" smtClean="0"/>
-              <a:t>Tern.java – </a:t>
-            </a:r>
-            <a:r>
-              <a:rPr lang="fr-FR" dirty="0" err="1" smtClean="0"/>
-              <a:t>Hover</a:t>
+              <a:t>Serveur </a:t>
+            </a:r>
+            <a:r>
+              <a:rPr lang="fr-FR" dirty="0" err="1" smtClean="0"/>
+              <a:t>Tern</a:t>
+            </a:r>
+            <a:r>
+              <a:rPr lang="fr-FR" dirty="0" smtClean="0"/>
+              <a:t>– </a:t>
+            </a:r>
+            <a:r>
+              <a:rPr lang="fr-FR" dirty="0" smtClean="0"/>
+              <a:t>Node.js</a:t>
             </a:r>
             <a:endParaRPr lang="fr-FR" dirty="0"/>
           </a:p>
@@ -6917,17 +7608,85 @@
         </p:nvSpPr>
         <p:spPr/>
         <p:txBody>
-          <a:bodyPr/>
-          <a:lstStyle/>
-          <a:p>
-            <a:endParaRPr lang="fr-FR" dirty="0"/>
-          </a:p>
-        </p:txBody>
-      </p:sp>
+          <a:bodyPr>
+            <a:normAutofit/>
+          </a:bodyPr>
+          <a:lstStyle/>
+          <a:p>
+            <a:pPr marL="342900" lvl="1" indent="-342900"/>
+            <a:r>
+              <a:rPr lang="fr-FR" dirty="0" smtClean="0"/>
+              <a:t>Node.js TODO explication</a:t>
+            </a:r>
+          </a:p>
+          <a:p>
+            <a:pPr marL="342900" lvl="1" indent="-342900"/>
+            <a:endParaRPr lang="fr-FR" dirty="0" smtClean="0"/>
+          </a:p>
+          <a:p>
+            <a:pPr marL="342900" lvl="1" indent="-342900"/>
+            <a:endParaRPr lang="fr-FR" dirty="0" smtClean="0"/>
+          </a:p>
+        </p:txBody>
+      </p:sp>
+      <p:pic>
+        <p:nvPicPr>
+          <p:cNvPr id="13315" name="Picture 3"/>
+          <p:cNvPicPr>
+            <a:picLocks noChangeAspect="1" noChangeArrowheads="1"/>
+          </p:cNvPicPr>
+          <p:nvPr/>
+        </p:nvPicPr>
+        <p:blipFill>
+          <a:blip r:embed="rId2">
+            <a:extLst>
+              <a:ext uri="{28A0092B-C50C-407E-A947-70E740481C1C}">
+                <a14:useLocalDpi xmlns:a14="http://schemas.microsoft.com/office/drawing/2010/main" val="0"/>
+              </a:ext>
+            </a:extLst>
+          </a:blip>
+          <a:srcRect/>
+          <a:stretch>
+            <a:fillRect/>
+          </a:stretch>
+        </p:blipFill>
+        <p:spPr bwMode="auto">
+          <a:xfrm>
+            <a:off x="1147763" y="1988840"/>
+            <a:ext cx="6848475" cy="3714750"/>
+          </a:xfrm>
+          <a:prstGeom prst="rect">
+            <a:avLst/>
+          </a:prstGeom>
+          <a:noFill/>
+          <a:ln>
+            <a:noFill/>
+          </a:ln>
+          <a:extLst>
+            <a:ext uri="{909E8E84-426E-40DD-AFC4-6F175D3DCCD1}">
+              <a14:hiddenFill xmlns:a14="http://schemas.microsoft.com/office/drawing/2010/main">
+                <a:solidFill>
+                  <a:schemeClr val="accent1"/>
+                </a:solidFill>
+              </a14:hiddenFill>
+            </a:ext>
+            <a:ext uri="{91240B29-F687-4F45-9708-019B960494DF}">
+              <a14:hiddenLine xmlns:a14="http://schemas.microsoft.com/office/drawing/2010/main" w="9525">
+                <a:solidFill>
+                  <a:schemeClr val="tx1"/>
+                </a:solidFill>
+                <a:miter lim="800000"/>
+                <a:headEnd/>
+                <a:tailEnd/>
+              </a14:hiddenLine>
+            </a:ext>
+          </a:extLst>
+        </p:spPr>
+      </p:pic>
     </p:spTree>
     <p:extLst>
       <p:ext uri="{BB962C8B-B14F-4D97-AF65-F5344CB8AC3E}">
-        <p14:creationId xmlns:p14="http://schemas.microsoft.com/office/powerpoint/2010/main" val="1158840641"/>
+        <p14:creationId xmlns:p14="http://schemas.microsoft.com/office/powerpoint/2010/main" val="2028752723"/>
       </p:ext>
     </p:extLst>
   </p:cSld>
@@ -6971,7 +7730,15 @@
           <a:p>
             <a:r>
               <a:rPr lang="fr-FR" dirty="0" smtClean="0"/>
-              <a:t>Tern.java – Lint</a:t>
+              <a:t>Serveur </a:t>
+            </a:r>
+            <a:r>
+              <a:rPr lang="fr-FR" dirty="0" err="1" smtClean="0"/>
+              <a:t>Tern</a:t>
+            </a:r>
+            <a:r>
+              <a:rPr lang="fr-FR" dirty="0" smtClean="0"/>
+              <a:t>– Node.js</a:t>
             </a:r>
             <a:endParaRPr lang="fr-FR" dirty="0"/>
           </a:p>
@@ -6989,17 +7756,191 @@
         </p:nvSpPr>
         <p:spPr/>
         <p:txBody>
-          <a:bodyPr/>
-          <a:lstStyle/>
-          <a:p>
+          <a:bodyPr>
+            <a:normAutofit/>
+          </a:bodyPr>
+          <a:lstStyle/>
+          <a:p>
+            <a:pPr marL="342900" lvl="1" indent="-342900"/>
+            <a:r>
+              <a:rPr lang="fr-FR" dirty="0" smtClean="0"/>
+              <a:t>La complétion Eclipse lance un serveur node.js avec </a:t>
+            </a:r>
+            <a:r>
+              <a:rPr lang="fr-FR" dirty="0" err="1" smtClean="0"/>
+              <a:t>tern</a:t>
+            </a:r>
+            <a:r>
+              <a:rPr lang="fr-FR" dirty="0" smtClean="0"/>
+              <a:t> et attend que </a:t>
+            </a:r>
+            <a:r>
+              <a:rPr lang="fr-FR" dirty="0" err="1" smtClean="0"/>
+              <a:t>tern</a:t>
+            </a:r>
+            <a:r>
+              <a:rPr lang="fr-FR" dirty="0" smtClean="0"/>
+              <a:t> soit initialisé.</a:t>
+            </a:r>
+          </a:p>
+          <a:p>
+            <a:pPr marL="342900" lvl="1" indent="-342900"/>
+            <a:r>
+              <a:rPr lang="fr-FR" dirty="0" smtClean="0"/>
+              <a:t>La complétion Eclipse communique via un client HTTP au serveur node.js via des requêtes/réponses JSON.</a:t>
+            </a:r>
+          </a:p>
+          <a:p>
+            <a:pPr marL="342900" lvl="1" indent="-342900"/>
+            <a:r>
+              <a:rPr lang="fr-FR" dirty="0" smtClean="0"/>
+              <a:t>Dans le cas ou l’on souhaite débugger (pas à pas) un </a:t>
+            </a:r>
+            <a:r>
+              <a:rPr lang="fr-FR" dirty="0" smtClean="0"/>
+              <a:t>p</a:t>
+            </a:r>
+            <a:r>
+              <a:rPr lang="fr-FR" dirty="0" smtClean="0"/>
+              <a:t>lugin </a:t>
+            </a:r>
+            <a:r>
+              <a:rPr lang="fr-FR" dirty="0" err="1" smtClean="0"/>
+              <a:t>tern</a:t>
+            </a:r>
+            <a:r>
+              <a:rPr lang="fr-FR" dirty="0" smtClean="0"/>
+              <a:t>,  la complétion ne doit pas lancer un serveur node.js. </a:t>
+            </a:r>
+            <a:r>
+              <a:rPr lang="fr-FR" b="1" dirty="0" err="1" smtClean="0"/>
+              <a:t>Remote</a:t>
+            </a:r>
+            <a:r>
+              <a:rPr lang="fr-FR" b="1" dirty="0" smtClean="0"/>
+              <a:t> </a:t>
+            </a:r>
+            <a:r>
+              <a:rPr lang="fr-FR" b="1" dirty="0" err="1" smtClean="0"/>
+              <a:t>access</a:t>
+            </a:r>
+            <a:r>
+              <a:rPr lang="fr-FR" dirty="0" smtClean="0"/>
+              <a:t> doit être configuré :</a:t>
+            </a:r>
+          </a:p>
+          <a:p>
+            <a:pPr marL="342900" lvl="1" indent="-342900"/>
             <a:endParaRPr lang="fr-FR" dirty="0"/>
           </a:p>
-        </p:txBody>
-      </p:sp>
+          <a:p>
+            <a:pPr marL="342900" lvl="1" indent="-342900"/>
+            <a:endParaRPr lang="fr-FR" dirty="0" smtClean="0"/>
+          </a:p>
+          <a:p>
+            <a:pPr marL="342900" lvl="1" indent="-342900"/>
+            <a:endParaRPr lang="fr-FR" dirty="0"/>
+          </a:p>
+          <a:p>
+            <a:pPr marL="342900" lvl="1" indent="-342900"/>
+            <a:endParaRPr lang="fr-FR" dirty="0" smtClean="0"/>
+          </a:p>
+          <a:p>
+            <a:pPr marL="342900" lvl="1" indent="-342900"/>
+            <a:r>
+              <a:rPr lang="fr-FR" dirty="0" smtClean="0"/>
+              <a:t>Dans ce cas-ci, le serveur node.js doit être lancé </a:t>
+            </a:r>
+            <a:r>
+              <a:rPr lang="fr-FR" dirty="0"/>
+              <a:t>par un système externe capable </a:t>
+            </a:r>
+            <a:r>
+              <a:rPr lang="fr-FR" dirty="0" smtClean="0"/>
+              <a:t>de débugger node.js (ex : </a:t>
+            </a:r>
+            <a:r>
+              <a:rPr lang="fr-FR" dirty="0" err="1" smtClean="0"/>
+              <a:t>Nodeclipse</a:t>
+            </a:r>
+            <a:r>
+              <a:rPr lang="fr-FR" dirty="0" smtClean="0"/>
+              <a:t>).</a:t>
+            </a:r>
+            <a:endParaRPr lang="fr-FR" dirty="0" smtClean="0"/>
+          </a:p>
+          <a:p>
+            <a:pPr marL="342900" lvl="1" indent="-342900"/>
+            <a:endParaRPr lang="fr-FR" dirty="0" smtClean="0"/>
+          </a:p>
+          <a:p>
+            <a:pPr marL="342900" lvl="1" indent="-342900"/>
+            <a:endParaRPr lang="fr-FR" dirty="0" smtClean="0"/>
+          </a:p>
+          <a:p>
+            <a:pPr marL="342900" lvl="1" indent="-342900"/>
+            <a:endParaRPr lang="fr-FR" dirty="0" smtClean="0"/>
+          </a:p>
+        </p:txBody>
+      </p:sp>
+      <p:pic>
+        <p:nvPicPr>
+          <p:cNvPr id="14338" name="Picture 2"/>
+          <p:cNvPicPr>
+            <a:picLocks noChangeAspect="1" noChangeArrowheads="1"/>
+          </p:cNvPicPr>
+          <p:nvPr/>
+        </p:nvPicPr>
+        <p:blipFill>
+          <a:blip r:embed="rId2">
+            <a:extLst>
+              <a:ext uri="{28A0092B-C50C-407E-A947-70E740481C1C}">
+                <a14:useLocalDpi xmlns:a14="http://schemas.microsoft.com/office/drawing/2010/main" val="0"/>
+              </a:ext>
+            </a:extLst>
+          </a:blip>
+          <a:srcRect/>
+          <a:stretch>
+            <a:fillRect/>
+          </a:stretch>
+        </p:blipFill>
+        <p:spPr bwMode="auto">
+          <a:xfrm>
+            <a:off x="1763688" y="3284984"/>
+            <a:ext cx="4514850" cy="1495425"/>
+          </a:xfrm>
+          <a:prstGeom prst="rect">
+            <a:avLst/>
+          </a:prstGeom>
+          <a:noFill/>
+          <a:ln>
+            <a:noFill/>
+          </a:ln>
+          <a:extLst>
+            <a:ext uri="{909E8E84-426E-40DD-AFC4-6F175D3DCCD1}">
+              <a14:hiddenFill xmlns:a14="http://schemas.microsoft.com/office/drawing/2010/main">
+                <a:solidFill>
+                  <a:schemeClr val="accent1"/>
+                </a:solidFill>
+              </a14:hiddenFill>
+            </a:ext>
+            <a:ext uri="{91240B29-F687-4F45-9708-019B960494DF}">
+              <a14:hiddenLine xmlns:a14="http://schemas.microsoft.com/office/drawing/2010/main" w="9525">
+                <a:solidFill>
+                  <a:schemeClr val="tx1"/>
+                </a:solidFill>
+                <a:miter lim="800000"/>
+                <a:headEnd/>
+                <a:tailEnd/>
+              </a14:hiddenLine>
+            </a:ext>
+          </a:extLst>
+        </p:spPr>
+      </p:pic>
     </p:spTree>
     <p:extLst>
       <p:ext uri="{BB962C8B-B14F-4D97-AF65-F5344CB8AC3E}">
-        <p14:creationId xmlns:p14="http://schemas.microsoft.com/office/powerpoint/2010/main" val="1158840641"/>
+        <p14:creationId xmlns:p14="http://schemas.microsoft.com/office/powerpoint/2010/main" val="2463886766"/>
       </p:ext>
     </p:extLst>
   </p:cSld>
@@ -7111,11 +8052,11 @@
           <a:p>
             <a:r>
               <a:rPr lang="fr-FR" dirty="0" smtClean="0"/>
-              <a:t>Il fournit la </a:t>
-            </a:r>
-            <a:r>
-              <a:rPr lang="fr-FR" dirty="0" err="1" smtClean="0"/>
-              <a:t>completion</a:t>
+              <a:t>Il fournit la complétion, </a:t>
+            </a:r>
+            <a:r>
+              <a:rPr lang="fr-FR" dirty="0" err="1" smtClean="0"/>
+              <a:t>hyperlink</a:t>
             </a:r>
             <a:r>
               <a:rPr lang="fr-FR" dirty="0" smtClean="0"/>
@@ -7123,14 +8064,6 @@
             </a:r>
             <a:r>
               <a:rPr lang="fr-FR" dirty="0" err="1" smtClean="0"/>
-              <a:t>hyperlink</a:t>
-            </a:r>
-            <a:r>
-              <a:rPr lang="fr-FR" dirty="0" smtClean="0"/>
-              <a:t>, </a:t>
-            </a:r>
-            <a:r>
-              <a:rPr lang="fr-FR" dirty="0" err="1" smtClean="0"/>
               <a:t>hover</a:t>
             </a:r>
             <a:r>
@@ -7143,7 +8076,7 @@
             </a:r>
             <a:r>
               <a:rPr lang="fr-FR" dirty="0" smtClean="0"/>
-              <a:t> pour :</a:t>
+              <a:t> dans:</a:t>
             </a:r>
           </a:p>
           <a:p>
@@ -7398,97 +8331,6 @@
 </file>
 
 <file path=ppt/slides/slide30.xml><?xml version="1.0" encoding="utf-8"?>
-<p:sld xmlns:a="http://schemas.openxmlformats.org/drawingml/2006/main" xmlns:r="http://schemas.openxmlformats.org/officeDocument/2006/relationships" xmlns:p="http://schemas.openxmlformats.org/presentationml/2006/main">
-  <p:cSld>
-    <p:spTree>
-      <p:nvGrpSpPr>
-        <p:cNvPr id="1" name=""/>
-        <p:cNvGrpSpPr/>
-        <p:nvPr/>
-      </p:nvGrpSpPr>
-      <p:grpSpPr>
-        <a:xfrm>
-          <a:off x="0" y="0"/>
-          <a:ext cx="0" cy="0"/>
-          <a:chOff x="0" y="0"/>
-          <a:chExt cx="0" cy="0"/>
-        </a:xfrm>
-      </p:grpSpPr>
-      <p:sp>
-        <p:nvSpPr>
-          <p:cNvPr id="2" name="Titre 1"/>
-          <p:cNvSpPr>
-            <a:spLocks noGrp="1"/>
-          </p:cNvSpPr>
-          <p:nvPr>
-            <p:ph type="title"/>
-          </p:nvPr>
-        </p:nvSpPr>
-        <p:spPr/>
-        <p:txBody>
-          <a:bodyPr/>
-          <a:lstStyle/>
-          <a:p>
-            <a:r>
-              <a:rPr lang="fr-FR" dirty="0" smtClean="0"/>
-              <a:t>Tern.java - TODOS</a:t>
-            </a:r>
-            <a:endParaRPr lang="fr-FR" dirty="0"/>
-          </a:p>
-        </p:txBody>
-      </p:sp>
-      <p:sp>
-        <p:nvSpPr>
-          <p:cNvPr id="3" name="Espace réservé du contenu 2"/>
-          <p:cNvSpPr>
-            <a:spLocks noGrp="1"/>
-          </p:cNvSpPr>
-          <p:nvPr>
-            <p:ph sz="quarter" idx="13"/>
-          </p:nvPr>
-        </p:nvSpPr>
-        <p:spPr/>
-        <p:txBody>
-          <a:bodyPr/>
-          <a:lstStyle/>
-          <a:p>
-            <a:r>
-              <a:rPr lang="fr-FR" dirty="0" err="1" smtClean="0"/>
-              <a:t>Refactoring</a:t>
-            </a:r>
-            <a:endParaRPr lang="fr-FR" dirty="0" smtClean="0"/>
-          </a:p>
-          <a:p>
-            <a:r>
-              <a:rPr lang="fr-FR" dirty="0" err="1" smtClean="0"/>
-              <a:t>Search</a:t>
-            </a:r>
-            <a:r>
-              <a:rPr lang="fr-FR" dirty="0" smtClean="0"/>
-              <a:t> </a:t>
-            </a:r>
-            <a:r>
-              <a:rPr lang="fr-FR" dirty="0" err="1" smtClean="0"/>
-              <a:t>references</a:t>
-            </a:r>
-            <a:endParaRPr lang="fr-FR" dirty="0"/>
-          </a:p>
-        </p:txBody>
-      </p:sp>
-    </p:spTree>
-    <p:extLst>
-      <p:ext uri="{BB962C8B-B14F-4D97-AF65-F5344CB8AC3E}">
-        <p14:creationId xmlns:p14="http://schemas.microsoft.com/office/powerpoint/2010/main" val="4273097244"/>
-      </p:ext>
-    </p:extLst>
-  </p:cSld>
-  <p:clrMapOvr>
-    <a:masterClrMapping/>
-  </p:clrMapOvr>
-</p:sld>
-</file>
-
-<file path=ppt/slides/slide31.xml><?xml version="1.0" encoding="utf-8"?>
 <p:sld xmlns:a="http://schemas.openxmlformats.org/drawingml/2006/main" xmlns:r="http://schemas.openxmlformats.org/officeDocument/2006/relationships" xmlns:p="http://schemas.openxmlformats.org/presentationml/2006/main">
   <p:cSld>
     <p:spTree>
@@ -7748,6 +8590,169 @@
     <p:extLst>
       <p:ext uri="{BB962C8B-B14F-4D97-AF65-F5344CB8AC3E}">
         <p14:creationId xmlns:p14="http://schemas.microsoft.com/office/powerpoint/2010/main" val="1436139672"/>
+      </p:ext>
+    </p:extLst>
+  </p:cSld>
+  <p:clrMapOvr>
+    <a:masterClrMapping/>
+  </p:clrMapOvr>
+</p:sld>
+</file>
+
+<file path=ppt/slides/slide31.xml><?xml version="1.0" encoding="utf-8"?>
+<p:sld xmlns:a="http://schemas.openxmlformats.org/drawingml/2006/main" xmlns:r="http://schemas.openxmlformats.org/officeDocument/2006/relationships" xmlns:p="http://schemas.openxmlformats.org/presentationml/2006/main">
+  <p:cSld>
+    <p:spTree>
+      <p:nvGrpSpPr>
+        <p:cNvPr id="1" name=""/>
+        <p:cNvGrpSpPr/>
+        <p:nvPr/>
+      </p:nvGrpSpPr>
+      <p:grpSpPr>
+        <a:xfrm>
+          <a:off x="0" y="0"/>
+          <a:ext cx="0" cy="0"/>
+          <a:chOff x="0" y="0"/>
+          <a:chExt cx="0" cy="0"/>
+        </a:xfrm>
+      </p:grpSpPr>
+      <p:sp>
+        <p:nvSpPr>
+          <p:cNvPr id="2" name="Titre 1"/>
+          <p:cNvSpPr>
+            <a:spLocks noGrp="1"/>
+          </p:cNvSpPr>
+          <p:nvPr>
+            <p:ph type="title"/>
+          </p:nvPr>
+        </p:nvSpPr>
+        <p:spPr/>
+        <p:txBody>
+          <a:bodyPr/>
+          <a:lstStyle/>
+          <a:p>
+            <a:r>
+              <a:rPr lang="fr-FR" dirty="0" smtClean="0"/>
+              <a:t>Tern.java - TODOS</a:t>
+            </a:r>
+            <a:endParaRPr lang="fr-FR" dirty="0"/>
+          </a:p>
+        </p:txBody>
+      </p:sp>
+      <p:sp>
+        <p:nvSpPr>
+          <p:cNvPr id="3" name="Espace réservé du contenu 2"/>
+          <p:cNvSpPr>
+            <a:spLocks noGrp="1"/>
+          </p:cNvSpPr>
+          <p:nvPr>
+            <p:ph sz="quarter" idx="13"/>
+          </p:nvPr>
+        </p:nvSpPr>
+        <p:spPr/>
+        <p:txBody>
+          <a:bodyPr/>
+          <a:lstStyle/>
+          <a:p>
+            <a:r>
+              <a:rPr lang="fr-FR" dirty="0" err="1" smtClean="0"/>
+              <a:t>Refactoring</a:t>
+            </a:r>
+            <a:endParaRPr lang="fr-FR" dirty="0" smtClean="0"/>
+          </a:p>
+          <a:p>
+            <a:r>
+              <a:rPr lang="fr-FR" dirty="0" err="1" smtClean="0"/>
+              <a:t>Search</a:t>
+            </a:r>
+            <a:r>
+              <a:rPr lang="fr-FR" dirty="0" smtClean="0"/>
+              <a:t> </a:t>
+            </a:r>
+            <a:r>
+              <a:rPr lang="fr-FR" dirty="0" err="1" smtClean="0"/>
+              <a:t>references</a:t>
+            </a:r>
+            <a:endParaRPr lang="fr-FR" dirty="0" smtClean="0"/>
+          </a:p>
+          <a:p>
+            <a:r>
+              <a:rPr lang="fr-FR" dirty="0" err="1" smtClean="0"/>
+              <a:t>Ameliorer</a:t>
+            </a:r>
+            <a:r>
+              <a:rPr lang="fr-FR" dirty="0" smtClean="0"/>
+              <a:t> les </a:t>
+            </a:r>
+            <a:r>
+              <a:rPr lang="fr-FR" dirty="0" err="1" smtClean="0"/>
+              <a:t>plugisn</a:t>
+            </a:r>
+            <a:r>
+              <a:rPr lang="fr-FR" dirty="0" smtClean="0"/>
+              <a:t> </a:t>
+            </a:r>
+            <a:r>
+              <a:rPr lang="fr-FR" dirty="0" err="1" smtClean="0"/>
+              <a:t>terns</a:t>
+            </a:r>
+            <a:endParaRPr lang="fr-FR" dirty="0" smtClean="0"/>
+          </a:p>
+          <a:p>
+            <a:r>
+              <a:rPr lang="fr-FR" dirty="0" smtClean="0"/>
+              <a:t>Améliorer tern.js pour : </a:t>
+            </a:r>
+          </a:p>
+          <a:p>
+            <a:pPr lvl="1"/>
+            <a:r>
+              <a:rPr lang="fr-FR" dirty="0" smtClean="0"/>
+              <a:t>Gérer la </a:t>
+            </a:r>
+            <a:r>
+              <a:rPr lang="fr-FR" dirty="0" err="1" smtClean="0"/>
+              <a:t>compléetion</a:t>
+            </a:r>
+            <a:r>
+              <a:rPr lang="fr-FR" dirty="0" smtClean="0"/>
+              <a:t>, </a:t>
+            </a:r>
+            <a:r>
+              <a:rPr lang="fr-FR" dirty="0" err="1" smtClean="0"/>
+              <a:t>hyperlink</a:t>
+            </a:r>
+            <a:r>
+              <a:rPr lang="fr-FR" dirty="0" smtClean="0"/>
+              <a:t>, </a:t>
+            </a:r>
+            <a:r>
+              <a:rPr lang="fr-FR" dirty="0" err="1" smtClean="0"/>
+              <a:t>hover</a:t>
+            </a:r>
+            <a:r>
+              <a:rPr lang="fr-FR" dirty="0" smtClean="0"/>
+              <a:t>, validation dans les string</a:t>
+            </a:r>
+          </a:p>
+          <a:p>
+            <a:pPr lvl="1"/>
+            <a:r>
+              <a:rPr lang="fr-FR" dirty="0" smtClean="0"/>
+              <a:t>Gérer les objets </a:t>
+            </a:r>
+            <a:r>
+              <a:rPr lang="fr-FR" smtClean="0"/>
+              <a:t>literaux</a:t>
+            </a:r>
+            <a:endParaRPr lang="fr-FR" dirty="0"/>
+          </a:p>
+        </p:txBody>
+      </p:sp>
+    </p:spTree>
+    <p:extLst>
+      <p:ext uri="{BB962C8B-B14F-4D97-AF65-F5344CB8AC3E}">
+        <p14:creationId xmlns:p14="http://schemas.microsoft.com/office/powerpoint/2010/main" val="4273097244"/>
       </p:ext>
     </p:extLst>
   </p:cSld>
@@ -8843,13 +9848,37 @@
             </a:r>
             <a:r>
               <a:rPr lang="fr-FR" dirty="0" smtClean="0"/>
-              <a:t> officiel: ecma5, browser, </a:t>
-            </a:r>
-            <a:r>
-              <a:rPr lang="fr-FR" dirty="0" err="1" smtClean="0"/>
+              <a:t> officiel: </a:t>
+            </a:r>
+            <a:r>
+              <a:rPr lang="fr-FR" b="1" dirty="0" smtClean="0"/>
+              <a:t>ecma5</a:t>
+            </a:r>
+            <a:r>
+              <a:rPr lang="fr-FR" dirty="0" smtClean="0"/>
+              <a:t>, </a:t>
+            </a:r>
+            <a:r>
+              <a:rPr lang="fr-FR" b="1" dirty="0" smtClean="0"/>
+              <a:t>browser</a:t>
+            </a:r>
+            <a:r>
+              <a:rPr lang="fr-FR" dirty="0" smtClean="0"/>
+              <a:t>, </a:t>
+            </a:r>
+            <a:r>
+              <a:rPr lang="fr-FR" b="1" dirty="0" err="1" smtClean="0"/>
               <a:t>jquery</a:t>
             </a:r>
-            <a:endParaRPr lang="fr-FR" dirty="0" smtClean="0"/>
+            <a:r>
+              <a:rPr lang="fr-FR" dirty="0" smtClean="0"/>
+              <a:t>, </a:t>
+            </a:r>
+            <a:r>
+              <a:rPr lang="fr-FR" b="1" dirty="0" err="1"/>
+              <a:t>underscore</a:t>
+            </a:r>
+            <a:endParaRPr lang="fr-FR" b="1" dirty="0" smtClean="0"/>
           </a:p>
           <a:p>
             <a:pPr lvl="1"/>
@@ -8900,7 +9929,7 @@
               <a:t>plugins officiels : </a:t>
             </a:r>
             <a:r>
-              <a:rPr lang="fr-FR" dirty="0" err="1" smtClean="0"/>
+              <a:rPr lang="fr-FR" b="1" dirty="0" err="1" smtClean="0"/>
               <a:t>angularjs</a:t>
             </a:r>
             <a:r>
@@ -8908,7 +9937,7 @@
               <a:t>, </a:t>
             </a:r>
             <a:r>
-              <a:rPr lang="fr-FR" dirty="0" err="1" smtClean="0"/>
+              <a:rPr lang="fr-FR" b="1" dirty="0" err="1" smtClean="0"/>
               <a:t>node</a:t>
             </a:r>
             <a:r>
@@ -8916,10 +9945,10 @@
               <a:t>, </a:t>
             </a:r>
             <a:r>
-              <a:rPr lang="fr-FR" dirty="0" err="1" smtClean="0"/>
+              <a:rPr lang="fr-FR" b="1" dirty="0" err="1" smtClean="0"/>
               <a:t>requirejs</a:t>
             </a:r>
-            <a:endParaRPr lang="fr-FR" dirty="0" smtClean="0"/>
+            <a:endParaRPr lang="fr-FR" b="1" dirty="0" smtClean="0"/>
           </a:p>
           <a:p>
             <a:pPr lvl="2"/>
@@ -8932,7 +9961,7 @@
               <a:t>lugins non officiels : </a:t>
             </a:r>
             <a:r>
-              <a:rPr lang="fr-FR" dirty="0" err="1" smtClean="0"/>
+              <a:rPr lang="fr-FR" b="1" dirty="0" err="1" smtClean="0"/>
               <a:t>AlloyUI</a:t>
             </a:r>
             <a:r>
@@ -8940,7 +9969,7 @@
               <a:t>, </a:t>
             </a:r>
             <a:r>
-              <a:rPr lang="fr-FR" dirty="0" err="1" smtClean="0"/>
+              <a:rPr lang="fr-FR" b="1" dirty="0" err="1" smtClean="0"/>
               <a:t>CKEditor</a:t>
             </a:r>
             <a:r>
@@ -8948,7 +9977,7 @@
               <a:t>, </a:t>
             </a:r>
             <a:r>
-              <a:rPr lang="fr-FR" dirty="0" err="1" smtClean="0"/>
+              <a:rPr lang="fr-FR" b="1" dirty="0" err="1" smtClean="0"/>
               <a:t>Closure</a:t>
             </a:r>
             <a:r>
@@ -8956,7 +9985,7 @@
               <a:t>, </a:t>
             </a:r>
             <a:r>
-              <a:rPr lang="fr-FR" dirty="0" err="1" smtClean="0"/>
+              <a:rPr lang="fr-FR" b="1" dirty="0" err="1" smtClean="0"/>
               <a:t>CordovaJS</a:t>
             </a:r>
             <a:r>
@@ -8964,48 +9993,8 @@
               <a:t>, </a:t>
             </a:r>
             <a:r>
-              <a:rPr lang="fr-FR" dirty="0"/>
-              <a:t>Dojo </a:t>
-            </a:r>
-            <a:r>
-              <a:rPr lang="fr-FR" dirty="0" smtClean="0"/>
-              <a:t>, </a:t>
-            </a:r>
-            <a:r>
-              <a:rPr lang="fr-FR" dirty="0" err="1" smtClean="0"/>
-              <a:t>ExtJS</a:t>
-            </a:r>
-            <a:r>
-              <a:rPr lang="fr-FR" dirty="0" smtClean="0"/>
-              <a:t>, Google </a:t>
-            </a:r>
-            <a:r>
-              <a:rPr lang="fr-FR" dirty="0" err="1" smtClean="0"/>
-              <a:t>Maps</a:t>
-            </a:r>
-            <a:r>
-              <a:rPr lang="fr-FR" dirty="0" smtClean="0"/>
-              <a:t>, </a:t>
-            </a:r>
-            <a:r>
-              <a:rPr lang="fr-FR" dirty="0" err="1" smtClean="0"/>
-              <a:t>Liferay</a:t>
-            </a:r>
-            <a:r>
-              <a:rPr lang="fr-FR" dirty="0" smtClean="0"/>
-              <a:t>, </a:t>
-            </a:r>
-            <a:r>
-              <a:rPr lang="fr-FR" dirty="0" err="1" smtClean="0"/>
-              <a:t>Meteor</a:t>
-            </a:r>
-            <a:r>
-              <a:rPr lang="fr-FR" dirty="0" smtClean="0"/>
-              <a:t>, </a:t>
-            </a:r>
-            <a:r>
-              <a:rPr lang="fr-FR" dirty="0" err="1"/>
-              <a:t>Qooxdoo</a:t>
+              <a:rPr lang="fr-FR" b="1" dirty="0"/>
+              <a:t>Dojo</a:t>
             </a:r>
             <a:r>
               <a:rPr lang="fr-FR" dirty="0"/>
@@ -9013,7 +10002,63 @@
             </a:r>
             <a:r>
               <a:rPr lang="fr-FR" dirty="0" smtClean="0"/>
-              <a:t>, YUI Library.</a:t>
+              <a:t>, </a:t>
+            </a:r>
+            <a:r>
+              <a:rPr lang="fr-FR" b="1" dirty="0" err="1" smtClean="0"/>
+              <a:t>ExtJS</a:t>
+            </a:r>
+            <a:r>
+              <a:rPr lang="fr-FR" dirty="0" smtClean="0"/>
+              <a:t>, </a:t>
+            </a:r>
+            <a:r>
+              <a:rPr lang="fr-FR" b="1" dirty="0" smtClean="0"/>
+              <a:t>Google </a:t>
+            </a:r>
+            <a:r>
+              <a:rPr lang="fr-FR" b="1" dirty="0" err="1" smtClean="0"/>
+              <a:t>Maps</a:t>
+            </a:r>
+            <a:r>
+              <a:rPr lang="fr-FR" dirty="0" smtClean="0"/>
+              <a:t>, </a:t>
+            </a:r>
+            <a:r>
+              <a:rPr lang="fr-FR" b="1" dirty="0" err="1" smtClean="0"/>
+              <a:t>Liferay</a:t>
+            </a:r>
+            <a:r>
+              <a:rPr lang="fr-FR" dirty="0" smtClean="0"/>
+              <a:t>, </a:t>
+            </a:r>
+            <a:r>
+              <a:rPr lang="fr-FR" b="1" dirty="0" err="1" smtClean="0"/>
+              <a:t>Meteor</a:t>
+            </a:r>
+            <a:r>
+              <a:rPr lang="fr-FR" dirty="0" smtClean="0"/>
+              <a:t>, </a:t>
+            </a:r>
+            <a:r>
+              <a:rPr lang="fr-FR" b="1" dirty="0" err="1"/>
+              <a:t>Qooxdoo</a:t>
+            </a:r>
+            <a:r>
+              <a:rPr lang="fr-FR" dirty="0"/>
+              <a:t> </a:t>
+            </a:r>
+            <a:r>
+              <a:rPr lang="fr-FR" dirty="0" smtClean="0"/>
+              <a:t>, </a:t>
+            </a:r>
+            <a:r>
+              <a:rPr lang="fr-FR" b="1" dirty="0" smtClean="0"/>
+              <a:t>YUI Library</a:t>
+            </a:r>
+            <a:r>
+              <a:rPr lang="fr-FR" dirty="0" smtClean="0"/>
+              <a:t>.</a:t>
             </a:r>
             <a:endParaRPr lang="fr-FR" dirty="0" smtClean="0"/>
           </a:p>

</xml_diff>